<commit_message>
update instructions (first release)
</commit_message>
<xml_diff>
--- a/sample/kubernetes/Bring your own device - Teil 1.pptx
+++ b/sample/kubernetes/Bring your own device - Teil 1.pptx
@@ -5,26 +5,27 @@
     <p:sldMasterId id="2147483648" r:id="rId1"/>
   </p:sldMasterIdLst>
   <p:notesMasterIdLst>
-    <p:notesMasterId r:id="rId19"/>
+    <p:notesMasterId r:id="rId20"/>
   </p:notesMasterIdLst>
   <p:sldIdLst>
     <p:sldId id="256" r:id="rId2"/>
-    <p:sldId id="257" r:id="rId3"/>
-    <p:sldId id="258" r:id="rId4"/>
-    <p:sldId id="259" r:id="rId5"/>
-    <p:sldId id="271" r:id="rId6"/>
-    <p:sldId id="260" r:id="rId7"/>
-    <p:sldId id="276" r:id="rId8"/>
-    <p:sldId id="265" r:id="rId9"/>
-    <p:sldId id="266" r:id="rId10"/>
-    <p:sldId id="272" r:id="rId11"/>
-    <p:sldId id="267" r:id="rId12"/>
-    <p:sldId id="268" r:id="rId13"/>
-    <p:sldId id="269" r:id="rId14"/>
-    <p:sldId id="274" r:id="rId15"/>
-    <p:sldId id="270" r:id="rId16"/>
-    <p:sldId id="273" r:id="rId17"/>
-    <p:sldId id="275" r:id="rId18"/>
+    <p:sldId id="279" r:id="rId3"/>
+    <p:sldId id="257" r:id="rId4"/>
+    <p:sldId id="258" r:id="rId5"/>
+    <p:sldId id="259" r:id="rId6"/>
+    <p:sldId id="271" r:id="rId7"/>
+    <p:sldId id="260" r:id="rId8"/>
+    <p:sldId id="278" r:id="rId9"/>
+    <p:sldId id="265" r:id="rId10"/>
+    <p:sldId id="266" r:id="rId11"/>
+    <p:sldId id="272" r:id="rId12"/>
+    <p:sldId id="267" r:id="rId13"/>
+    <p:sldId id="268" r:id="rId14"/>
+    <p:sldId id="269" r:id="rId15"/>
+    <p:sldId id="274" r:id="rId16"/>
+    <p:sldId id="270" r:id="rId17"/>
+    <p:sldId id="273" r:id="rId18"/>
+    <p:sldId id="277" r:id="rId19"/>
   </p:sldIdLst>
   <p:sldSz cx="12192000" cy="6858000"/>
   <p:notesSz cx="6858000" cy="9144000"/>
@@ -555,6 +556,174 @@
     <p:extLst>
       <p:ext uri="{BB962C8B-B14F-4D97-AF65-F5344CB8AC3E}">
         <p14:creationId xmlns:p14="http://schemas.microsoft.com/office/powerpoint/2010/main" val="2211466151"/>
+      </p:ext>
+    </p:extLst>
+  </p:cSld>
+  <p:clrMapOvr>
+    <a:masterClrMapping/>
+  </p:clrMapOvr>
+</p:notes>
+</file>
+
+<file path=ppt/notesSlides/notesSlide2.xml><?xml version="1.0" encoding="utf-8"?>
+<p:notes xmlns:a="http://schemas.openxmlformats.org/drawingml/2006/main" xmlns:r="http://schemas.openxmlformats.org/officeDocument/2006/relationships" xmlns:p="http://schemas.openxmlformats.org/presentationml/2006/main">
+  <p:cSld>
+    <p:spTree>
+      <p:nvGrpSpPr>
+        <p:cNvPr id="1" name=""/>
+        <p:cNvGrpSpPr/>
+        <p:nvPr/>
+      </p:nvGrpSpPr>
+      <p:grpSpPr>
+        <a:xfrm>
+          <a:off x="0" y="0"/>
+          <a:ext cx="0" cy="0"/>
+          <a:chOff x="0" y="0"/>
+          <a:chExt cx="0" cy="0"/>
+        </a:xfrm>
+      </p:grpSpPr>
+      <p:sp>
+        <p:nvSpPr>
+          <p:cNvPr id="2" name="Folienbildplatzhalter 1"/>
+          <p:cNvSpPr>
+            <a:spLocks noGrp="1" noRot="1" noChangeAspect="1"/>
+          </p:cNvSpPr>
+          <p:nvPr>
+            <p:ph type="sldImg"/>
+          </p:nvPr>
+        </p:nvSpPr>
+        <p:spPr/>
+      </p:sp>
+      <p:sp>
+        <p:nvSpPr>
+          <p:cNvPr id="3" name="Notizenplatzhalter 2"/>
+          <p:cNvSpPr>
+            <a:spLocks noGrp="1"/>
+          </p:cNvSpPr>
+          <p:nvPr>
+            <p:ph type="body" idx="1"/>
+          </p:nvPr>
+        </p:nvSpPr>
+        <p:spPr/>
+        <p:txBody>
+          <a:bodyPr/>
+          <a:lstStyle/>
+          <a:p>
+            <a:endParaRPr lang="de-DE" dirty="0"/>
+          </a:p>
+        </p:txBody>
+      </p:sp>
+      <p:sp>
+        <p:nvSpPr>
+          <p:cNvPr id="4" name="Foliennummernplatzhalter 3"/>
+          <p:cNvSpPr>
+            <a:spLocks noGrp="1"/>
+          </p:cNvSpPr>
+          <p:nvPr>
+            <p:ph type="sldNum" sz="quarter" idx="5"/>
+          </p:nvPr>
+        </p:nvSpPr>
+        <p:spPr/>
+        <p:txBody>
+          <a:bodyPr/>
+          <a:lstStyle/>
+          <a:p>
+            <a:fld id="{430D2433-C2A2-F54F-B5A8-3B6039D09A1B}" type="slidenum">
+              <a:rPr lang="de-DE" smtClean="0"/>
+              <a:t>2</a:t>
+            </a:fld>
+            <a:endParaRPr lang="de-DE"/>
+          </a:p>
+        </p:txBody>
+      </p:sp>
+    </p:spTree>
+    <p:extLst>
+      <p:ext uri="{BB962C8B-B14F-4D97-AF65-F5344CB8AC3E}">
+        <p14:creationId xmlns:p14="http://schemas.microsoft.com/office/powerpoint/2010/main" val="113594748"/>
+      </p:ext>
+    </p:extLst>
+  </p:cSld>
+  <p:clrMapOvr>
+    <a:masterClrMapping/>
+  </p:clrMapOvr>
+</p:notes>
+</file>
+
+<file path=ppt/notesSlides/notesSlide3.xml><?xml version="1.0" encoding="utf-8"?>
+<p:notes xmlns:a="http://schemas.openxmlformats.org/drawingml/2006/main" xmlns:r="http://schemas.openxmlformats.org/officeDocument/2006/relationships" xmlns:p="http://schemas.openxmlformats.org/presentationml/2006/main">
+  <p:cSld>
+    <p:spTree>
+      <p:nvGrpSpPr>
+        <p:cNvPr id="1" name=""/>
+        <p:cNvGrpSpPr/>
+        <p:nvPr/>
+      </p:nvGrpSpPr>
+      <p:grpSpPr>
+        <a:xfrm>
+          <a:off x="0" y="0"/>
+          <a:ext cx="0" cy="0"/>
+          <a:chOff x="0" y="0"/>
+          <a:chExt cx="0" cy="0"/>
+        </a:xfrm>
+      </p:grpSpPr>
+      <p:sp>
+        <p:nvSpPr>
+          <p:cNvPr id="2" name="Folienbildplatzhalter 1"/>
+          <p:cNvSpPr>
+            <a:spLocks noGrp="1" noRot="1" noChangeAspect="1"/>
+          </p:cNvSpPr>
+          <p:nvPr>
+            <p:ph type="sldImg"/>
+          </p:nvPr>
+        </p:nvSpPr>
+        <p:spPr/>
+      </p:sp>
+      <p:sp>
+        <p:nvSpPr>
+          <p:cNvPr id="3" name="Notizenplatzhalter 2"/>
+          <p:cNvSpPr>
+            <a:spLocks noGrp="1"/>
+          </p:cNvSpPr>
+          <p:nvPr>
+            <p:ph type="body" idx="1"/>
+          </p:nvPr>
+        </p:nvSpPr>
+        <p:spPr/>
+        <p:txBody>
+          <a:bodyPr/>
+          <a:lstStyle/>
+          <a:p>
+            <a:endParaRPr lang="de-DE" dirty="0"/>
+          </a:p>
+        </p:txBody>
+      </p:sp>
+      <p:sp>
+        <p:nvSpPr>
+          <p:cNvPr id="4" name="Foliennummernplatzhalter 3"/>
+          <p:cNvSpPr>
+            <a:spLocks noGrp="1"/>
+          </p:cNvSpPr>
+          <p:nvPr>
+            <p:ph type="sldNum" sz="quarter" idx="5"/>
+          </p:nvPr>
+        </p:nvSpPr>
+        <p:spPr/>
+        <p:txBody>
+          <a:bodyPr/>
+          <a:lstStyle/>
+          <a:p>
+            <a:fld id="{430D2433-C2A2-F54F-B5A8-3B6039D09A1B}" type="slidenum">
+              <a:rPr lang="de-DE" smtClean="0"/>
+              <a:t>8</a:t>
+            </a:fld>
+            <a:endParaRPr lang="de-DE"/>
+          </a:p>
+        </p:txBody>
+      </p:sp>
+    </p:spTree>
+    <p:extLst>
+      <p:ext uri="{BB962C8B-B14F-4D97-AF65-F5344CB8AC3E}">
+        <p14:creationId xmlns:p14="http://schemas.microsoft.com/office/powerpoint/2010/main" val="4171361410"/>
       </p:ext>
     </p:extLst>
   </p:cSld>
@@ -3817,10 +3986,6 @@
               <a:rPr lang="de-DE" dirty="0" err="1"/>
               <a:t>device</a:t>
             </a:r>
-            <a:r>
-              <a:rPr lang="de-DE" dirty="0"/>
-              <a:t> -</a:t>
-            </a:r>
             <a:br>
               <a:rPr lang="de-DE" dirty="0"/>
             </a:br>
@@ -3897,6 +4062,255 @@
 </file>
 
 <file path=ppt/slides/slide10.xml><?xml version="1.0" encoding="utf-8"?>
+<p:sld xmlns:a="http://schemas.openxmlformats.org/drawingml/2006/main" xmlns:r="http://schemas.openxmlformats.org/officeDocument/2006/relationships" xmlns:p="http://schemas.openxmlformats.org/presentationml/2006/main">
+  <p:cSld>
+    <p:spTree>
+      <p:nvGrpSpPr>
+        <p:cNvPr id="1" name=""/>
+        <p:cNvGrpSpPr/>
+        <p:nvPr/>
+      </p:nvGrpSpPr>
+      <p:grpSpPr>
+        <a:xfrm>
+          <a:off x="0" y="0"/>
+          <a:ext cx="0" cy="0"/>
+          <a:chOff x="0" y="0"/>
+          <a:chExt cx="0" cy="0"/>
+        </a:xfrm>
+      </p:grpSpPr>
+      <p:sp>
+        <p:nvSpPr>
+          <p:cNvPr id="2" name="Titel 1">
+            <a:extLst>
+              <a:ext uri="{FF2B5EF4-FFF2-40B4-BE49-F238E27FC236}">
+                <a16:creationId xmlns:a16="http://schemas.microsoft.com/office/drawing/2014/main" id="{54472761-F6BA-A4DF-6E97-094AE60B729E}"/>
+              </a:ext>
+            </a:extLst>
+          </p:cNvPr>
+          <p:cNvSpPr>
+            <a:spLocks noGrp="1"/>
+          </p:cNvSpPr>
+          <p:nvPr>
+            <p:ph type="title"/>
+          </p:nvPr>
+        </p:nvSpPr>
+        <p:spPr/>
+        <p:txBody>
+          <a:bodyPr/>
+          <a:lstStyle/>
+          <a:p>
+            <a:r>
+              <a:rPr lang="de-DE" dirty="0"/>
+              <a:t>Master </a:t>
+            </a:r>
+            <a:r>
+              <a:rPr lang="de-DE" dirty="0" err="1"/>
+              <a:t>Node</a:t>
+            </a:r>
+            <a:r>
+              <a:rPr lang="de-DE" dirty="0"/>
+              <a:t> einrichten</a:t>
+            </a:r>
+          </a:p>
+        </p:txBody>
+      </p:sp>
+      <p:sp>
+        <p:nvSpPr>
+          <p:cNvPr id="3" name="Inhaltsplatzhalter 2">
+            <a:extLst>
+              <a:ext uri="{FF2B5EF4-FFF2-40B4-BE49-F238E27FC236}">
+                <a16:creationId xmlns:a16="http://schemas.microsoft.com/office/drawing/2014/main" id="{A6C84D30-D395-411D-5201-F8BC8F103909}"/>
+              </a:ext>
+            </a:extLst>
+          </p:cNvPr>
+          <p:cNvSpPr>
+            <a:spLocks noGrp="1"/>
+          </p:cNvSpPr>
+          <p:nvPr>
+            <p:ph idx="1"/>
+          </p:nvPr>
+        </p:nvSpPr>
+        <p:spPr/>
+        <p:txBody>
+          <a:bodyPr>
+            <a:normAutofit/>
+          </a:bodyPr>
+          <a:lstStyle/>
+          <a:p>
+            <a:r>
+              <a:rPr lang="de-DE" dirty="0" err="1"/>
+              <a:t>Kubernetes</a:t>
+            </a:r>
+            <a:r>
+              <a:rPr lang="de-DE" dirty="0"/>
+              <a:t> installieren (2):</a:t>
+            </a:r>
+          </a:p>
+          <a:p>
+            <a:pPr marL="0" indent="0">
+              <a:buNone/>
+            </a:pPr>
+            <a:r>
+              <a:rPr lang="de-DE" sz="2400" dirty="0">
+                <a:latin typeface="Courier New" panose="02070309020205020404" pitchFamily="49" charset="0"/>
+                <a:cs typeface="Courier New" panose="02070309020205020404" pitchFamily="49" charset="0"/>
+              </a:rPr>
+              <a:t>	multipass </a:t>
+            </a:r>
+            <a:r>
+              <a:rPr lang="de-DE" sz="2400" dirty="0" err="1">
+                <a:latin typeface="Courier New" panose="02070309020205020404" pitchFamily="49" charset="0"/>
+                <a:cs typeface="Courier New" panose="02070309020205020404" pitchFamily="49" charset="0"/>
+              </a:rPr>
+              <a:t>shell</a:t>
+            </a:r>
+            <a:r>
+              <a:rPr lang="de-DE" sz="2400" dirty="0">
+                <a:latin typeface="Courier New" panose="02070309020205020404" pitchFamily="49" charset="0"/>
+                <a:cs typeface="Courier New" panose="02070309020205020404" pitchFamily="49" charset="0"/>
+              </a:rPr>
+              <a:t> </a:t>
+            </a:r>
+            <a:r>
+              <a:rPr lang="de-DE" sz="2400" dirty="0" err="1">
+                <a:latin typeface="Courier New" panose="02070309020205020404" pitchFamily="49" charset="0"/>
+                <a:cs typeface="Courier New" panose="02070309020205020404" pitchFamily="49" charset="0"/>
+              </a:rPr>
+              <a:t>master</a:t>
+            </a:r>
+            <a:endParaRPr lang="de-DE" sz="2400" dirty="0">
+              <a:latin typeface="Courier New" panose="02070309020205020404" pitchFamily="49" charset="0"/>
+              <a:cs typeface="Courier New" panose="02070309020205020404" pitchFamily="49" charset="0"/>
+            </a:endParaRPr>
+          </a:p>
+          <a:p>
+            <a:pPr marL="0" indent="0">
+              <a:buNone/>
+            </a:pPr>
+            <a:r>
+              <a:rPr lang="de-DE" sz="2400" dirty="0">
+                <a:latin typeface="Courier New" panose="02070309020205020404" pitchFamily="49" charset="0"/>
+                <a:cs typeface="Courier New" panose="02070309020205020404" pitchFamily="49" charset="0"/>
+              </a:rPr>
+              <a:t>	microk8s </a:t>
+            </a:r>
+            <a:r>
+              <a:rPr lang="de-DE" sz="2400" dirty="0" err="1">
+                <a:latin typeface="Courier New" panose="02070309020205020404" pitchFamily="49" charset="0"/>
+                <a:cs typeface="Courier New" panose="02070309020205020404" pitchFamily="49" charset="0"/>
+              </a:rPr>
+              <a:t>enable</a:t>
+            </a:r>
+            <a:r>
+              <a:rPr lang="de-DE" sz="2400" dirty="0">
+                <a:latin typeface="Courier New" panose="02070309020205020404" pitchFamily="49" charset="0"/>
+                <a:cs typeface="Courier New" panose="02070309020205020404" pitchFamily="49" charset="0"/>
+              </a:rPr>
+              <a:t> </a:t>
+            </a:r>
+            <a:r>
+              <a:rPr lang="de-DE" sz="2400" dirty="0" err="1">
+                <a:latin typeface="Courier New" panose="02070309020205020404" pitchFamily="49" charset="0"/>
+                <a:cs typeface="Courier New" panose="02070309020205020404" pitchFamily="49" charset="0"/>
+              </a:rPr>
+              <a:t>dns</a:t>
+            </a:r>
+            <a:r>
+              <a:rPr lang="de-DE" sz="2400" dirty="0">
+                <a:latin typeface="Courier New" panose="02070309020205020404" pitchFamily="49" charset="0"/>
+                <a:cs typeface="Courier New" panose="02070309020205020404" pitchFamily="49" charset="0"/>
+              </a:rPr>
+              <a:t> </a:t>
+            </a:r>
+            <a:r>
+              <a:rPr lang="de-DE" sz="2400" dirty="0" err="1">
+                <a:latin typeface="Courier New" panose="02070309020205020404" pitchFamily="49" charset="0"/>
+                <a:cs typeface="Courier New" panose="02070309020205020404" pitchFamily="49" charset="0"/>
+              </a:rPr>
+              <a:t>dashboard</a:t>
+            </a:r>
+            <a:r>
+              <a:rPr lang="de-DE" sz="2400" dirty="0">
+                <a:latin typeface="Courier New" panose="02070309020205020404" pitchFamily="49" charset="0"/>
+                <a:cs typeface="Courier New" panose="02070309020205020404" pitchFamily="49" charset="0"/>
+              </a:rPr>
+              <a:t> </a:t>
+            </a:r>
+            <a:r>
+              <a:rPr lang="de-DE" sz="2400" dirty="0" err="1">
+                <a:latin typeface="Courier New" panose="02070309020205020404" pitchFamily="49" charset="0"/>
+                <a:cs typeface="Courier New" panose="02070309020205020404" pitchFamily="49" charset="0"/>
+              </a:rPr>
+              <a:t>ingress</a:t>
+            </a:r>
+            <a:endParaRPr lang="de-DE" sz="2400" dirty="0">
+              <a:latin typeface="Courier New" panose="02070309020205020404" pitchFamily="49" charset="0"/>
+              <a:cs typeface="Courier New" panose="02070309020205020404" pitchFamily="49" charset="0"/>
+            </a:endParaRPr>
+          </a:p>
+          <a:p>
+            <a:pPr marL="0" indent="0">
+              <a:buNone/>
+            </a:pPr>
+            <a:r>
+              <a:rPr lang="de-DE" sz="2400" dirty="0">
+                <a:latin typeface="Courier New" panose="02070309020205020404" pitchFamily="49" charset="0"/>
+                <a:cs typeface="Courier New" panose="02070309020205020404" pitchFamily="49" charset="0"/>
+              </a:rPr>
+              <a:t>	microk8s </a:t>
+            </a:r>
+            <a:r>
+              <a:rPr lang="de-DE" sz="2400" dirty="0" err="1">
+                <a:latin typeface="Courier New" panose="02070309020205020404" pitchFamily="49" charset="0"/>
+                <a:cs typeface="Courier New" panose="02070309020205020404" pitchFamily="49" charset="0"/>
+              </a:rPr>
+              <a:t>dashboard</a:t>
+            </a:r>
+            <a:r>
+              <a:rPr lang="de-DE" sz="2400" dirty="0">
+                <a:latin typeface="Courier New" panose="02070309020205020404" pitchFamily="49" charset="0"/>
+                <a:cs typeface="Courier New" panose="02070309020205020404" pitchFamily="49" charset="0"/>
+              </a:rPr>
+              <a:t>-proxy</a:t>
+            </a:r>
+          </a:p>
+          <a:p>
+            <a:pPr lvl="1"/>
+            <a:r>
+              <a:rPr lang="de-DE" dirty="0">
+                <a:cs typeface="Courier New" panose="02070309020205020404" pitchFamily="49" charset="0"/>
+              </a:rPr>
+              <a:t>Bitte warten, das kann ein paar Minuten dauern!</a:t>
+            </a:r>
+          </a:p>
+          <a:p>
+            <a:pPr marL="0" indent="0">
+              <a:buNone/>
+            </a:pPr>
+            <a:r>
+              <a:rPr lang="de-DE" dirty="0">
+                <a:latin typeface="Courier New" panose="02070309020205020404" pitchFamily="49" charset="0"/>
+                <a:cs typeface="Courier New" panose="02070309020205020404" pitchFamily="49" charset="0"/>
+              </a:rPr>
+              <a:t>	</a:t>
+            </a:r>
+          </a:p>
+        </p:txBody>
+      </p:sp>
+    </p:spTree>
+    <p:extLst>
+      <p:ext uri="{BB962C8B-B14F-4D97-AF65-F5344CB8AC3E}">
+        <p14:creationId xmlns:p14="http://schemas.microsoft.com/office/powerpoint/2010/main" val="614538028"/>
+      </p:ext>
+    </p:extLst>
+  </p:cSld>
+  <p:clrMapOvr>
+    <a:masterClrMapping/>
+  </p:clrMapOvr>
+</p:sld>
+</file>
+
+<file path=ppt/slides/slide11.xml><?xml version="1.0" encoding="utf-8"?>
 <p:sld xmlns:a="http://schemas.openxmlformats.org/drawingml/2006/main" xmlns:r="http://schemas.openxmlformats.org/officeDocument/2006/relationships" xmlns:p="http://schemas.openxmlformats.org/presentationml/2006/main">
   <p:cSld>
     <p:spTree>
@@ -4088,7 +4502,7 @@
 </p:sld>
 </file>
 
-<file path=ppt/slides/slide11.xml><?xml version="1.0" encoding="utf-8"?>
+<file path=ppt/slides/slide12.xml><?xml version="1.0" encoding="utf-8"?>
 <p:sld xmlns:a="http://schemas.openxmlformats.org/drawingml/2006/main" xmlns:r="http://schemas.openxmlformats.org/officeDocument/2006/relationships" xmlns:p="http://schemas.openxmlformats.org/presentationml/2006/main">
   <p:cSld>
     <p:spTree>
@@ -4359,7 +4773,7 @@
 </p:sld>
 </file>
 
-<file path=ppt/slides/slide12.xml><?xml version="1.0" encoding="utf-8"?>
+<file path=ppt/slides/slide13.xml><?xml version="1.0" encoding="utf-8"?>
 <p:sld xmlns:a="http://schemas.openxmlformats.org/drawingml/2006/main" xmlns:r="http://schemas.openxmlformats.org/officeDocument/2006/relationships" xmlns:p="http://schemas.openxmlformats.org/presentationml/2006/main">
   <p:cSld>
     <p:spTree>
@@ -4460,44 +4874,7 @@
                 <a:latin typeface="Courier New" panose="02070309020205020404" pitchFamily="49" charset="0"/>
                 <a:cs typeface="Courier New" panose="02070309020205020404" pitchFamily="49" charset="0"/>
               </a:rPr>
-              <a:t>multipass launch --name worker1 --</a:t>
-            </a:r>
-            <a:r>
-              <a:rPr lang="de-DE" sz="2400" dirty="0" err="1">
-                <a:latin typeface="Courier New" panose="02070309020205020404" pitchFamily="49" charset="0"/>
-                <a:cs typeface="Courier New" panose="02070309020205020404" pitchFamily="49" charset="0"/>
-              </a:rPr>
-              <a:t>cpus</a:t>
-            </a:r>
-            <a:r>
-              <a:rPr lang="de-DE" sz="2400" dirty="0">
-                <a:latin typeface="Courier New" panose="02070309020205020404" pitchFamily="49" charset="0"/>
-                <a:cs typeface="Courier New" panose="02070309020205020404" pitchFamily="49" charset="0"/>
-              </a:rPr>
-              <a:t> 2 --memory 4G --disk 20G </a:t>
-            </a:r>
-            <a:r>
-              <a:rPr lang="de-DE" sz="2400" dirty="0" err="1">
-                <a:latin typeface="Courier New" panose="02070309020205020404" pitchFamily="49" charset="0"/>
-                <a:cs typeface="Courier New" panose="02070309020205020404" pitchFamily="49" charset="0"/>
-              </a:rPr>
-              <a:t>lts</a:t>
-            </a:r>
-            <a:endParaRPr lang="de-DE" sz="2400" dirty="0">
-              <a:latin typeface="Courier New" panose="02070309020205020404" pitchFamily="49" charset="0"/>
-              <a:cs typeface="Courier New" panose="02070309020205020404" pitchFamily="49" charset="0"/>
-            </a:endParaRPr>
-          </a:p>
-          <a:p>
-            <a:pPr marL="0" indent="0">
-              <a:buNone/>
-            </a:pPr>
-            <a:r>
-              <a:rPr lang="de-DE" sz="2400" dirty="0">
-                <a:latin typeface="Courier New" panose="02070309020205020404" pitchFamily="49" charset="0"/>
-                <a:cs typeface="Courier New" panose="02070309020205020404" pitchFamily="49" charset="0"/>
-              </a:rPr>
-              <a:t>	multipass </a:t>
+              <a:t>multipass </a:t>
             </a:r>
             <a:r>
               <a:rPr lang="de-DE" sz="2400" dirty="0" err="1">
@@ -4704,7 +5081,7 @@
 </p:sld>
 </file>
 
-<file path=ppt/slides/slide13.xml><?xml version="1.0" encoding="utf-8"?>
+<file path=ppt/slides/slide14.xml><?xml version="1.0" encoding="utf-8"?>
 <p:sld xmlns:a="http://schemas.openxmlformats.org/drawingml/2006/main" xmlns:r="http://schemas.openxmlformats.org/officeDocument/2006/relationships" xmlns:p="http://schemas.openxmlformats.org/presentationml/2006/main">
   <p:cSld>
     <p:spTree>
@@ -4994,179 +5371,6 @@
 </p:sld>
 </file>
 
-<file path=ppt/slides/slide14.xml><?xml version="1.0" encoding="utf-8"?>
-<p:sld xmlns:a="http://schemas.openxmlformats.org/drawingml/2006/main" xmlns:r="http://schemas.openxmlformats.org/officeDocument/2006/relationships" xmlns:p="http://schemas.openxmlformats.org/presentationml/2006/main">
-  <p:cSld>
-    <p:spTree>
-      <p:nvGrpSpPr>
-        <p:cNvPr id="1" name=""/>
-        <p:cNvGrpSpPr/>
-        <p:nvPr/>
-      </p:nvGrpSpPr>
-      <p:grpSpPr>
-        <a:xfrm>
-          <a:off x="0" y="0"/>
-          <a:ext cx="0" cy="0"/>
-          <a:chOff x="0" y="0"/>
-          <a:chExt cx="0" cy="0"/>
-        </a:xfrm>
-      </p:grpSpPr>
-      <p:sp>
-        <p:nvSpPr>
-          <p:cNvPr id="2" name="Titel 1">
-            <a:extLst>
-              <a:ext uri="{FF2B5EF4-FFF2-40B4-BE49-F238E27FC236}">
-                <a16:creationId xmlns:a16="http://schemas.microsoft.com/office/drawing/2014/main" id="{97B81511-FD40-5DFB-A11C-439D47FC7E4E}"/>
-              </a:ext>
-            </a:extLst>
-          </p:cNvPr>
-          <p:cNvSpPr>
-            <a:spLocks noGrp="1"/>
-          </p:cNvSpPr>
-          <p:nvPr>
-            <p:ph type="title"/>
-          </p:nvPr>
-        </p:nvSpPr>
-        <p:spPr/>
-        <p:txBody>
-          <a:bodyPr/>
-          <a:lstStyle/>
-          <a:p>
-            <a:r>
-              <a:rPr lang="de-DE" dirty="0"/>
-              <a:t>Zufügen eines </a:t>
-            </a:r>
-            <a:r>
-              <a:rPr lang="de-DE" dirty="0" err="1"/>
-              <a:t>Worker</a:t>
-            </a:r>
-            <a:r>
-              <a:rPr lang="de-DE" dirty="0"/>
-              <a:t> Nodes</a:t>
-            </a:r>
-          </a:p>
-        </p:txBody>
-      </p:sp>
-      <p:sp>
-        <p:nvSpPr>
-          <p:cNvPr id="3" name="Inhaltsplatzhalter 2">
-            <a:extLst>
-              <a:ext uri="{FF2B5EF4-FFF2-40B4-BE49-F238E27FC236}">
-                <a16:creationId xmlns:a16="http://schemas.microsoft.com/office/drawing/2014/main" id="{D60DEAA2-318F-E89B-9305-4E4F17176745}"/>
-              </a:ext>
-            </a:extLst>
-          </p:cNvPr>
-          <p:cNvSpPr>
-            <a:spLocks noGrp="1"/>
-          </p:cNvSpPr>
-          <p:nvPr>
-            <p:ph idx="1"/>
-          </p:nvPr>
-        </p:nvSpPr>
-        <p:spPr/>
-        <p:txBody>
-          <a:bodyPr>
-            <a:normAutofit/>
-          </a:bodyPr>
-          <a:lstStyle/>
-          <a:p>
-            <a:r>
-              <a:rPr lang="de-DE" dirty="0">
-                <a:latin typeface="Courier New" panose="02070309020205020404" pitchFamily="49" charset="0"/>
-                <a:cs typeface="Courier New" panose="02070309020205020404" pitchFamily="49" charset="0"/>
-              </a:rPr>
-              <a:t>worker1</a:t>
-            </a:r>
-            <a:r>
-              <a:rPr lang="de-DE" dirty="0"/>
-              <a:t> einrichten (3):</a:t>
-            </a:r>
-          </a:p>
-          <a:p>
-            <a:pPr marL="0" indent="0">
-              <a:buNone/>
-            </a:pPr>
-            <a:r>
-              <a:rPr lang="de-DE" sz="2400" dirty="0"/>
-              <a:t>	</a:t>
-            </a:r>
-            <a:r>
-              <a:rPr lang="de-DE" sz="2400" dirty="0">
-                <a:latin typeface="Courier New" panose="02070309020205020404" pitchFamily="49" charset="0"/>
-                <a:cs typeface="Courier New" panose="02070309020205020404" pitchFamily="49" charset="0"/>
-              </a:rPr>
-              <a:t>multipass </a:t>
-            </a:r>
-            <a:r>
-              <a:rPr lang="de-DE" sz="2400" dirty="0" err="1">
-                <a:latin typeface="Courier New" panose="02070309020205020404" pitchFamily="49" charset="0"/>
-                <a:cs typeface="Courier New" panose="02070309020205020404" pitchFamily="49" charset="0"/>
-              </a:rPr>
-              <a:t>shell</a:t>
-            </a:r>
-            <a:r>
-              <a:rPr lang="de-DE" sz="2400" dirty="0">
-                <a:latin typeface="Courier New" panose="02070309020205020404" pitchFamily="49" charset="0"/>
-                <a:cs typeface="Courier New" panose="02070309020205020404" pitchFamily="49" charset="0"/>
-              </a:rPr>
-              <a:t> worker1</a:t>
-            </a:r>
-          </a:p>
-          <a:p>
-            <a:pPr marL="0" indent="0">
-              <a:buNone/>
-            </a:pPr>
-            <a:r>
-              <a:rPr lang="de-DE" sz="2400" dirty="0">
-                <a:latin typeface="Courier New" panose="02070309020205020404" pitchFamily="49" charset="0"/>
-                <a:cs typeface="Courier New" panose="02070309020205020404" pitchFamily="49" charset="0"/>
-              </a:rPr>
-              <a:t>	microk8s </a:t>
-            </a:r>
-            <a:r>
-              <a:rPr lang="de-DE" sz="2400" dirty="0" err="1">
-                <a:latin typeface="Courier New" panose="02070309020205020404" pitchFamily="49" charset="0"/>
-                <a:cs typeface="Courier New" panose="02070309020205020404" pitchFamily="49" charset="0"/>
-              </a:rPr>
-              <a:t>join</a:t>
-            </a:r>
-            <a:r>
-              <a:rPr lang="de-DE" sz="2400" dirty="0">
-                <a:latin typeface="Courier New" panose="02070309020205020404" pitchFamily="49" charset="0"/>
-                <a:cs typeface="Courier New" panose="02070309020205020404" pitchFamily="49" charset="0"/>
-              </a:rPr>
-              <a:t> 10.165.29.118:25000/b472c565140265866448027bde23cd3d/02e550107dbb --</a:t>
-            </a:r>
-            <a:r>
-              <a:rPr lang="de-DE" sz="2400" dirty="0" err="1">
-                <a:latin typeface="Courier New" panose="02070309020205020404" pitchFamily="49" charset="0"/>
-                <a:cs typeface="Courier New" panose="02070309020205020404" pitchFamily="49" charset="0"/>
-              </a:rPr>
-              <a:t>worker</a:t>
-            </a:r>
-            <a:r>
-              <a:rPr lang="de-DE" sz="2400" dirty="0">
-                <a:latin typeface="Courier New" panose="02070309020205020404" pitchFamily="49" charset="0"/>
-                <a:cs typeface="Courier New" panose="02070309020205020404" pitchFamily="49" charset="0"/>
-              </a:rPr>
-              <a:t>		</a:t>
-            </a:r>
-          </a:p>
-        </p:txBody>
-      </p:sp>
-    </p:spTree>
-    <p:extLst>
-      <p:ext uri="{BB962C8B-B14F-4D97-AF65-F5344CB8AC3E}">
-        <p14:creationId xmlns:p14="http://schemas.microsoft.com/office/powerpoint/2010/main" val="2577374115"/>
-      </p:ext>
-    </p:extLst>
-  </p:cSld>
-  <p:clrMapOvr>
-    <a:masterClrMapping/>
-  </p:clrMapOvr>
-</p:sld>
-</file>
-
 <file path=ppt/slides/slide15.xml><?xml version="1.0" encoding="utf-8"?>
 <p:sld xmlns:a="http://schemas.openxmlformats.org/drawingml/2006/main" xmlns:r="http://schemas.openxmlformats.org/officeDocument/2006/relationships" xmlns:p="http://schemas.openxmlformats.org/presentationml/2006/main">
   <p:cSld>
@@ -5244,8 +5448,173 @@
           <a:lstStyle/>
           <a:p>
             <a:r>
-              <a:rPr lang="de-DE" dirty="0"/>
-              <a:t>worker1 einrichten (3):</a:t>
+              <a:rPr lang="de-DE" dirty="0">
+                <a:latin typeface="Courier New" panose="02070309020205020404" pitchFamily="49" charset="0"/>
+                <a:cs typeface="Courier New" panose="02070309020205020404" pitchFamily="49" charset="0"/>
+              </a:rPr>
+              <a:t>worker1</a:t>
+            </a:r>
+            <a:r>
+              <a:rPr lang="de-DE" dirty="0"/>
+              <a:t> einrichten (3):</a:t>
+            </a:r>
+          </a:p>
+          <a:p>
+            <a:pPr lvl="1"/>
+            <a:r>
+              <a:rPr lang="de-DE" dirty="0"/>
+              <a:t>Bitte auf </a:t>
+            </a:r>
+            <a:r>
+              <a:rPr lang="de-DE" dirty="0">
+                <a:latin typeface="Courier New" panose="02070309020205020404" pitchFamily="49" charset="0"/>
+                <a:cs typeface="Courier New" panose="02070309020205020404" pitchFamily="49" charset="0"/>
+              </a:rPr>
+              <a:t>worker1</a:t>
+            </a:r>
+            <a:r>
+              <a:rPr lang="de-DE" dirty="0"/>
+              <a:t> ausführen:</a:t>
+            </a:r>
+          </a:p>
+          <a:p>
+            <a:pPr marL="0" indent="0">
+              <a:buNone/>
+            </a:pPr>
+            <a:r>
+              <a:rPr lang="de-DE" sz="2400" dirty="0"/>
+              <a:t>	</a:t>
+            </a:r>
+            <a:r>
+              <a:rPr lang="de-DE" sz="2400" dirty="0">
+                <a:latin typeface="Courier New" panose="02070309020205020404" pitchFamily="49" charset="0"/>
+                <a:cs typeface="Courier New" panose="02070309020205020404" pitchFamily="49" charset="0"/>
+              </a:rPr>
+              <a:t>microk8s </a:t>
+            </a:r>
+            <a:r>
+              <a:rPr lang="de-DE" sz="2400" dirty="0" err="1">
+                <a:latin typeface="Courier New" panose="02070309020205020404" pitchFamily="49" charset="0"/>
+                <a:cs typeface="Courier New" panose="02070309020205020404" pitchFamily="49" charset="0"/>
+              </a:rPr>
+              <a:t>join</a:t>
+            </a:r>
+            <a:r>
+              <a:rPr lang="de-DE" sz="2400" dirty="0">
+                <a:latin typeface="Courier New" panose="02070309020205020404" pitchFamily="49" charset="0"/>
+                <a:cs typeface="Courier New" panose="02070309020205020404" pitchFamily="49" charset="0"/>
+              </a:rPr>
+              <a:t> 10.165.29.118:25000/b472c565140265866448027bde23cd3d/02e550107dbb --</a:t>
+            </a:r>
+            <a:r>
+              <a:rPr lang="de-DE" sz="2400" dirty="0" err="1">
+                <a:latin typeface="Courier New" panose="02070309020205020404" pitchFamily="49" charset="0"/>
+                <a:cs typeface="Courier New" panose="02070309020205020404" pitchFamily="49" charset="0"/>
+              </a:rPr>
+              <a:t>worker</a:t>
+            </a:r>
+            <a:r>
+              <a:rPr lang="de-DE" sz="2400" dirty="0">
+                <a:latin typeface="Courier New" panose="02070309020205020404" pitchFamily="49" charset="0"/>
+                <a:cs typeface="Courier New" panose="02070309020205020404" pitchFamily="49" charset="0"/>
+              </a:rPr>
+              <a:t>		</a:t>
+            </a:r>
+          </a:p>
+        </p:txBody>
+      </p:sp>
+    </p:spTree>
+    <p:extLst>
+      <p:ext uri="{BB962C8B-B14F-4D97-AF65-F5344CB8AC3E}">
+        <p14:creationId xmlns:p14="http://schemas.microsoft.com/office/powerpoint/2010/main" val="2577374115"/>
+      </p:ext>
+    </p:extLst>
+  </p:cSld>
+  <p:clrMapOvr>
+    <a:masterClrMapping/>
+  </p:clrMapOvr>
+</p:sld>
+</file>
+
+<file path=ppt/slides/slide16.xml><?xml version="1.0" encoding="utf-8"?>
+<p:sld xmlns:a="http://schemas.openxmlformats.org/drawingml/2006/main" xmlns:r="http://schemas.openxmlformats.org/officeDocument/2006/relationships" xmlns:p="http://schemas.openxmlformats.org/presentationml/2006/main">
+  <p:cSld>
+    <p:spTree>
+      <p:nvGrpSpPr>
+        <p:cNvPr id="1" name=""/>
+        <p:cNvGrpSpPr/>
+        <p:nvPr/>
+      </p:nvGrpSpPr>
+      <p:grpSpPr>
+        <a:xfrm>
+          <a:off x="0" y="0"/>
+          <a:ext cx="0" cy="0"/>
+          <a:chOff x="0" y="0"/>
+          <a:chExt cx="0" cy="0"/>
+        </a:xfrm>
+      </p:grpSpPr>
+      <p:sp>
+        <p:nvSpPr>
+          <p:cNvPr id="2" name="Titel 1">
+            <a:extLst>
+              <a:ext uri="{FF2B5EF4-FFF2-40B4-BE49-F238E27FC236}">
+                <a16:creationId xmlns:a16="http://schemas.microsoft.com/office/drawing/2014/main" id="{97B81511-FD40-5DFB-A11C-439D47FC7E4E}"/>
+              </a:ext>
+            </a:extLst>
+          </p:cNvPr>
+          <p:cNvSpPr>
+            <a:spLocks noGrp="1"/>
+          </p:cNvSpPr>
+          <p:nvPr>
+            <p:ph type="title"/>
+          </p:nvPr>
+        </p:nvSpPr>
+        <p:spPr/>
+        <p:txBody>
+          <a:bodyPr/>
+          <a:lstStyle/>
+          <a:p>
+            <a:r>
+              <a:rPr lang="de-DE" dirty="0"/>
+              <a:t>Zufügen eines </a:t>
+            </a:r>
+            <a:r>
+              <a:rPr lang="de-DE" dirty="0" err="1"/>
+              <a:t>Worker</a:t>
+            </a:r>
+            <a:r>
+              <a:rPr lang="de-DE" dirty="0"/>
+              <a:t> Nodes</a:t>
+            </a:r>
+          </a:p>
+        </p:txBody>
+      </p:sp>
+      <p:sp>
+        <p:nvSpPr>
+          <p:cNvPr id="3" name="Inhaltsplatzhalter 2">
+            <a:extLst>
+              <a:ext uri="{FF2B5EF4-FFF2-40B4-BE49-F238E27FC236}">
+                <a16:creationId xmlns:a16="http://schemas.microsoft.com/office/drawing/2014/main" id="{D60DEAA2-318F-E89B-9305-4E4F17176745}"/>
+              </a:ext>
+            </a:extLst>
+          </p:cNvPr>
+          <p:cNvSpPr>
+            <a:spLocks noGrp="1"/>
+          </p:cNvSpPr>
+          <p:nvPr>
+            <p:ph idx="1"/>
+          </p:nvPr>
+        </p:nvSpPr>
+        <p:spPr/>
+        <p:txBody>
+          <a:bodyPr>
+            <a:normAutofit/>
+          </a:bodyPr>
+          <a:lstStyle/>
+          <a:p>
+            <a:r>
+              <a:rPr lang="de-DE" dirty="0"/>
+              <a:t>worker1 einrichten (4):</a:t>
             </a:r>
           </a:p>
           <a:p>
@@ -5307,7 +5676,7 @@
 </p:sld>
 </file>
 
-<file path=ppt/slides/slide16.xml><?xml version="1.0" encoding="utf-8"?>
+<file path=ppt/slides/slide17.xml><?xml version="1.0" encoding="utf-8"?>
 <p:sld xmlns:a="http://schemas.openxmlformats.org/drawingml/2006/main" xmlns:r="http://schemas.openxmlformats.org/officeDocument/2006/relationships" xmlns:p="http://schemas.openxmlformats.org/presentationml/2006/main">
   <p:cSld>
     <p:spTree>
@@ -5451,7 +5820,7 @@
 </p:sld>
 </file>
 
-<file path=ppt/slides/slide17.xml><?xml version="1.0" encoding="utf-8"?>
+<file path=ppt/slides/slide18.xml><?xml version="1.0" encoding="utf-8"?>
 <p:sld xmlns:a="http://schemas.openxmlformats.org/drawingml/2006/main" xmlns:r="http://schemas.openxmlformats.org/officeDocument/2006/relationships" xmlns:p="http://schemas.openxmlformats.org/presentationml/2006/main">
   <p:cSld>
     <p:spTree>
@@ -5491,7 +5860,7 @@
           <a:p>
             <a:r>
               <a:rPr lang="de-DE" dirty="0"/>
-              <a:t>Stoppen der VMs</a:t>
+              <a:t>Zufügen des Datenbank-Servers</a:t>
             </a:r>
           </a:p>
         </p:txBody>
@@ -5520,30 +5889,38 @@
           <a:lstStyle/>
           <a:p>
             <a:r>
-              <a:rPr lang="de-DE" dirty="0"/>
-              <a:t>Entweder: in der VM</a:t>
-            </a:r>
-            <a:endParaRPr lang="de-DE" dirty="0">
-              <a:cs typeface="Courier New" panose="02070309020205020404" pitchFamily="49" charset="0"/>
-            </a:endParaRPr>
+              <a:rPr lang="de-DE" dirty="0" err="1">
+                <a:latin typeface="Courier New" panose="02070309020205020404" pitchFamily="49" charset="0"/>
+                <a:cs typeface="Courier New" panose="02070309020205020404" pitchFamily="49" charset="0"/>
+              </a:rPr>
+              <a:t>db</a:t>
+            </a:r>
+            <a:r>
+              <a:rPr lang="de-DE" dirty="0"/>
+              <a:t> einrichten:</a:t>
+            </a:r>
           </a:p>
           <a:p>
             <a:pPr marL="0" indent="0">
               <a:buNone/>
             </a:pPr>
             <a:r>
+              <a:rPr lang="de-DE" dirty="0"/>
+              <a:t>	</a:t>
+            </a:r>
+            <a:r>
               <a:rPr lang="de-DE" sz="2400" dirty="0">
                 <a:latin typeface="Courier New" panose="02070309020205020404" pitchFamily="49" charset="0"/>
                 <a:cs typeface="Courier New" panose="02070309020205020404" pitchFamily="49" charset="0"/>
               </a:rPr>
-              <a:t>	</a:t>
+              <a:t>multipass </a:t>
             </a:r>
             <a:r>
               <a:rPr lang="de-DE" sz="2400" dirty="0" err="1">
                 <a:latin typeface="Courier New" panose="02070309020205020404" pitchFamily="49" charset="0"/>
                 <a:cs typeface="Courier New" panose="02070309020205020404" pitchFamily="49" charset="0"/>
               </a:rPr>
-              <a:t>sudo</a:t>
+              <a:t>shell</a:t>
             </a:r>
             <a:r>
               <a:rPr lang="de-DE" sz="2400" dirty="0">
@@ -5557,21 +5934,7 @@
                 <a:latin typeface="Courier New" panose="02070309020205020404" pitchFamily="49" charset="0"/>
                 <a:cs typeface="Courier New" panose="02070309020205020404" pitchFamily="49" charset="0"/>
               </a:rPr>
-              <a:t>shutdown</a:t>
-            </a:r>
-            <a:r>
-              <a:rPr lang="de-DE" sz="2400" dirty="0">
-                <a:latin typeface="Courier New" panose="02070309020205020404" pitchFamily="49" charset="0"/>
-                <a:cs typeface="Courier New" panose="02070309020205020404" pitchFamily="49" charset="0"/>
-              </a:rPr>
-              <a:t> –h </a:t>
-            </a:r>
-            <a:r>
-              <a:rPr lang="de-DE" sz="2400" dirty="0" err="1">
-                <a:latin typeface="Courier New" panose="02070309020205020404" pitchFamily="49" charset="0"/>
-                <a:cs typeface="Courier New" panose="02070309020205020404" pitchFamily="49" charset="0"/>
-              </a:rPr>
-              <a:t>now</a:t>
+              <a:t>db</a:t>
             </a:r>
             <a:endParaRPr lang="de-DE" sz="2400" dirty="0">
               <a:latin typeface="Courier New" panose="02070309020205020404" pitchFamily="49" charset="0"/>
@@ -5582,35 +5945,19 @@
             <a:pPr marL="0" indent="0">
               <a:buNone/>
             </a:pPr>
-            <a:endParaRPr lang="de-DE" dirty="0">
-              <a:cs typeface="Courier New" panose="02070309020205020404" pitchFamily="49" charset="0"/>
-            </a:endParaRPr>
-          </a:p>
-          <a:p>
-            <a:r>
-              <a:rPr lang="de-DE" dirty="0">
-                <a:cs typeface="Courier New" panose="02070309020205020404" pitchFamily="49" charset="0"/>
-              </a:rPr>
-              <a:t>Oder: im Terminal des Host-Rechners</a:t>
-            </a:r>
-          </a:p>
-          <a:p>
-            <a:pPr marL="0" indent="0">
-              <a:buNone/>
-            </a:pPr>
             <a:r>
               <a:rPr lang="de-DE" sz="2400" dirty="0">
                 <a:latin typeface="Courier New" panose="02070309020205020404" pitchFamily="49" charset="0"/>
                 <a:cs typeface="Courier New" panose="02070309020205020404" pitchFamily="49" charset="0"/>
               </a:rPr>
-              <a:t>	multipass </a:t>
+              <a:t>	</a:t>
             </a:r>
             <a:r>
               <a:rPr lang="de-DE" sz="2400" dirty="0" err="1">
                 <a:latin typeface="Courier New" panose="02070309020205020404" pitchFamily="49" charset="0"/>
                 <a:cs typeface="Courier New" panose="02070309020205020404" pitchFamily="49" charset="0"/>
               </a:rPr>
-              <a:t>stop</a:t>
+              <a:t>sudo</a:t>
             </a:r>
             <a:r>
               <a:rPr lang="de-DE" sz="2400" dirty="0">
@@ -5624,68 +5971,217 @@
                 <a:latin typeface="Courier New" panose="02070309020205020404" pitchFamily="49" charset="0"/>
                 <a:cs typeface="Courier New" panose="02070309020205020404" pitchFamily="49" charset="0"/>
               </a:rPr>
-              <a:t>master</a:t>
+              <a:t>snap</a:t>
             </a:r>
             <a:r>
               <a:rPr lang="de-DE" sz="2400" dirty="0">
                 <a:latin typeface="Courier New" panose="02070309020205020404" pitchFamily="49" charset="0"/>
                 <a:cs typeface="Courier New" panose="02070309020205020404" pitchFamily="49" charset="0"/>
               </a:rPr>
-              <a:t> worker1 worker2</a:t>
-            </a:r>
-          </a:p>
-          <a:p>
-            <a:pPr marL="0" indent="0">
-              <a:buNone/>
-            </a:pPr>
-            <a:endParaRPr lang="de-DE" dirty="0">
-              <a:latin typeface="Courier New" panose="02070309020205020404" pitchFamily="49" charset="0"/>
-              <a:cs typeface="Courier New" panose="02070309020205020404" pitchFamily="49" charset="0"/>
-            </a:endParaRPr>
-          </a:p>
-          <a:p>
-            <a:r>
-              <a:rPr lang="de-DE" dirty="0">
-                <a:cs typeface="Courier New" panose="02070309020205020404" pitchFamily="49" charset="0"/>
-              </a:rPr>
-              <a:t>Hinweis: Abfrage des Status der VMs</a:t>
-            </a:r>
-          </a:p>
-          <a:p>
-            <a:pPr marL="0" indent="0">
-              <a:buNone/>
-            </a:pPr>
+              <a:t> </a:t>
+            </a:r>
+            <a:r>
+              <a:rPr lang="de-DE" sz="2400" dirty="0" err="1">
+                <a:latin typeface="Courier New" panose="02070309020205020404" pitchFamily="49" charset="0"/>
+                <a:cs typeface="Courier New" panose="02070309020205020404" pitchFamily="49" charset="0"/>
+              </a:rPr>
+              <a:t>install</a:t>
+            </a:r>
             <a:r>
               <a:rPr lang="de-DE" sz="2400" dirty="0">
-                <a:cs typeface="Courier New" panose="02070309020205020404" pitchFamily="49" charset="0"/>
-              </a:rPr>
-              <a:t>	</a:t>
-            </a:r>
-            <a:r>
-              <a:rPr lang="de-DE" sz="2400" dirty="0">
-                <a:latin typeface="Courier New" panose="02070309020205020404" pitchFamily="49" charset="0"/>
-                <a:cs typeface="Courier New" panose="02070309020205020404" pitchFamily="49" charset="0"/>
-              </a:rPr>
-              <a:t>multipass </a:t>
+                <a:latin typeface="Courier New" panose="02070309020205020404" pitchFamily="49" charset="0"/>
+                <a:cs typeface="Courier New" panose="02070309020205020404" pitchFamily="49" charset="0"/>
+              </a:rPr>
+              <a:t> </a:t>
             </a:r>
             <a:r>
               <a:rPr lang="de-DE" sz="2400" dirty="0" err="1">
                 <a:latin typeface="Courier New" panose="02070309020205020404" pitchFamily="49" charset="0"/>
                 <a:cs typeface="Courier New" panose="02070309020205020404" pitchFamily="49" charset="0"/>
               </a:rPr>
-              <a:t>list</a:t>
+              <a:t>docker</a:t>
             </a:r>
             <a:endParaRPr lang="de-DE" sz="2400" dirty="0">
               <a:latin typeface="Courier New" panose="02070309020205020404" pitchFamily="49" charset="0"/>
               <a:cs typeface="Courier New" panose="02070309020205020404" pitchFamily="49" charset="0"/>
             </a:endParaRPr>
           </a:p>
+          <a:p>
+            <a:pPr marL="0" indent="0">
+              <a:buNone/>
+            </a:pPr>
+            <a:r>
+              <a:rPr lang="de-DE" sz="2400" dirty="0">
+                <a:latin typeface="Courier New" panose="02070309020205020404" pitchFamily="49" charset="0"/>
+                <a:cs typeface="Courier New" panose="02070309020205020404" pitchFamily="49" charset="0"/>
+              </a:rPr>
+              <a:t>	</a:t>
+            </a:r>
+            <a:r>
+              <a:rPr lang="de-DE" sz="2400" dirty="0" err="1">
+                <a:latin typeface="Courier New" panose="02070309020205020404" pitchFamily="49" charset="0"/>
+                <a:cs typeface="Courier New" panose="02070309020205020404" pitchFamily="49" charset="0"/>
+              </a:rPr>
+              <a:t>sudo</a:t>
+            </a:r>
+            <a:r>
+              <a:rPr lang="de-DE" sz="2400" dirty="0">
+                <a:latin typeface="Courier New" panose="02070309020205020404" pitchFamily="49" charset="0"/>
+                <a:cs typeface="Courier New" panose="02070309020205020404" pitchFamily="49" charset="0"/>
+              </a:rPr>
+              <a:t> </a:t>
+            </a:r>
+            <a:r>
+              <a:rPr lang="de-DE" sz="2400" dirty="0" err="1">
+                <a:latin typeface="Courier New" panose="02070309020205020404" pitchFamily="49" charset="0"/>
+                <a:cs typeface="Courier New" panose="02070309020205020404" pitchFamily="49" charset="0"/>
+              </a:rPr>
+              <a:t>addgroup</a:t>
+            </a:r>
+            <a:r>
+              <a:rPr lang="de-DE" sz="2400" dirty="0">
+                <a:latin typeface="Courier New" panose="02070309020205020404" pitchFamily="49" charset="0"/>
+                <a:cs typeface="Courier New" panose="02070309020205020404" pitchFamily="49" charset="0"/>
+              </a:rPr>
+              <a:t> --system </a:t>
+            </a:r>
+            <a:r>
+              <a:rPr lang="de-DE" sz="2400" dirty="0" err="1">
+                <a:latin typeface="Courier New" panose="02070309020205020404" pitchFamily="49" charset="0"/>
+                <a:cs typeface="Courier New" panose="02070309020205020404" pitchFamily="49" charset="0"/>
+              </a:rPr>
+              <a:t>docker</a:t>
+            </a:r>
+            <a:endParaRPr lang="de-DE" sz="2400" dirty="0">
+              <a:latin typeface="Courier New" panose="02070309020205020404" pitchFamily="49" charset="0"/>
+              <a:cs typeface="Courier New" panose="02070309020205020404" pitchFamily="49" charset="0"/>
+            </a:endParaRPr>
+          </a:p>
+          <a:p>
+            <a:pPr marL="0" indent="0">
+              <a:buNone/>
+            </a:pPr>
+            <a:r>
+              <a:rPr lang="de-DE" sz="2400" dirty="0">
+                <a:latin typeface="Courier New" panose="02070309020205020404" pitchFamily="49" charset="0"/>
+                <a:cs typeface="Courier New" panose="02070309020205020404" pitchFamily="49" charset="0"/>
+              </a:rPr>
+              <a:t>	</a:t>
+            </a:r>
+            <a:r>
+              <a:rPr lang="de-DE" sz="2400" dirty="0" err="1">
+                <a:latin typeface="Courier New" panose="02070309020205020404" pitchFamily="49" charset="0"/>
+                <a:cs typeface="Courier New" panose="02070309020205020404" pitchFamily="49" charset="0"/>
+              </a:rPr>
+              <a:t>sudo</a:t>
+            </a:r>
+            <a:r>
+              <a:rPr lang="de-DE" sz="2400" dirty="0">
+                <a:latin typeface="Courier New" panose="02070309020205020404" pitchFamily="49" charset="0"/>
+                <a:cs typeface="Courier New" panose="02070309020205020404" pitchFamily="49" charset="0"/>
+              </a:rPr>
+              <a:t> </a:t>
+            </a:r>
+            <a:r>
+              <a:rPr lang="de-DE" sz="2400" dirty="0" err="1">
+                <a:latin typeface="Courier New" panose="02070309020205020404" pitchFamily="49" charset="0"/>
+                <a:cs typeface="Courier New" panose="02070309020205020404" pitchFamily="49" charset="0"/>
+              </a:rPr>
+              <a:t>adduser</a:t>
+            </a:r>
+            <a:r>
+              <a:rPr lang="de-DE" sz="2400" dirty="0">
+                <a:latin typeface="Courier New" panose="02070309020205020404" pitchFamily="49" charset="0"/>
+                <a:cs typeface="Courier New" panose="02070309020205020404" pitchFamily="49" charset="0"/>
+              </a:rPr>
+              <a:t> $USER </a:t>
+            </a:r>
+            <a:r>
+              <a:rPr lang="de-DE" sz="2400" dirty="0" err="1">
+                <a:latin typeface="Courier New" panose="02070309020205020404" pitchFamily="49" charset="0"/>
+                <a:cs typeface="Courier New" panose="02070309020205020404" pitchFamily="49" charset="0"/>
+              </a:rPr>
+              <a:t>docker</a:t>
+            </a:r>
+            <a:endParaRPr lang="de-DE" sz="2400" dirty="0">
+              <a:latin typeface="Courier New" panose="02070309020205020404" pitchFamily="49" charset="0"/>
+              <a:cs typeface="Courier New" panose="02070309020205020404" pitchFamily="49" charset="0"/>
+            </a:endParaRPr>
+          </a:p>
+          <a:p>
+            <a:pPr marL="0" indent="0">
+              <a:buNone/>
+            </a:pPr>
+            <a:r>
+              <a:rPr lang="de-DE" sz="2400" dirty="0">
+                <a:latin typeface="Courier New" panose="02070309020205020404" pitchFamily="49" charset="0"/>
+                <a:cs typeface="Courier New" panose="02070309020205020404" pitchFamily="49" charset="0"/>
+              </a:rPr>
+              <a:t>	</a:t>
+            </a:r>
+            <a:r>
+              <a:rPr lang="de-DE" sz="2400" dirty="0" err="1">
+                <a:latin typeface="Courier New" panose="02070309020205020404" pitchFamily="49" charset="0"/>
+                <a:cs typeface="Courier New" panose="02070309020205020404" pitchFamily="49" charset="0"/>
+              </a:rPr>
+              <a:t>sudo</a:t>
+            </a:r>
+            <a:r>
+              <a:rPr lang="de-DE" sz="2400" dirty="0">
+                <a:latin typeface="Courier New" panose="02070309020205020404" pitchFamily="49" charset="0"/>
+                <a:cs typeface="Courier New" panose="02070309020205020404" pitchFamily="49" charset="0"/>
+              </a:rPr>
+              <a:t> </a:t>
+            </a:r>
+            <a:r>
+              <a:rPr lang="de-DE" sz="2400" dirty="0" err="1">
+                <a:latin typeface="Courier New" panose="02070309020205020404" pitchFamily="49" charset="0"/>
+                <a:cs typeface="Courier New" panose="02070309020205020404" pitchFamily="49" charset="0"/>
+              </a:rPr>
+              <a:t>shutdown</a:t>
+            </a:r>
+            <a:r>
+              <a:rPr lang="de-DE" sz="2400" dirty="0">
+                <a:latin typeface="Courier New" panose="02070309020205020404" pitchFamily="49" charset="0"/>
+                <a:cs typeface="Courier New" panose="02070309020205020404" pitchFamily="49" charset="0"/>
+              </a:rPr>
+              <a:t> -</a:t>
+            </a:r>
+            <a:r>
+              <a:rPr lang="de-DE" sz="2400" dirty="0" err="1">
+                <a:latin typeface="Courier New" panose="02070309020205020404" pitchFamily="49" charset="0"/>
+                <a:cs typeface="Courier New" panose="02070309020205020404" pitchFamily="49" charset="0"/>
+              </a:rPr>
+              <a:t>r</a:t>
+            </a:r>
+            <a:r>
+              <a:rPr lang="de-DE" sz="2400" dirty="0">
+                <a:latin typeface="Courier New" panose="02070309020205020404" pitchFamily="49" charset="0"/>
+                <a:cs typeface="Courier New" panose="02070309020205020404" pitchFamily="49" charset="0"/>
+              </a:rPr>
+              <a:t> </a:t>
+            </a:r>
+            <a:r>
+              <a:rPr lang="de-DE" sz="2400" dirty="0" err="1">
+                <a:latin typeface="Courier New" panose="02070309020205020404" pitchFamily="49" charset="0"/>
+                <a:cs typeface="Courier New" panose="02070309020205020404" pitchFamily="49" charset="0"/>
+              </a:rPr>
+              <a:t>now</a:t>
+            </a:r>
+            <a:r>
+              <a:rPr lang="de-DE" dirty="0">
+                <a:latin typeface="Courier New" panose="02070309020205020404" pitchFamily="49" charset="0"/>
+                <a:cs typeface="Courier New" panose="02070309020205020404" pitchFamily="49" charset="0"/>
+              </a:rPr>
+              <a:t>	</a:t>
+            </a:r>
+          </a:p>
         </p:txBody>
       </p:sp>
     </p:spTree>
     <p:extLst>
       <p:ext uri="{BB962C8B-B14F-4D97-AF65-F5344CB8AC3E}">
-        <p14:creationId xmlns:p14="http://schemas.microsoft.com/office/powerpoint/2010/main" val="1546802034"/>
+        <p14:creationId xmlns:p14="http://schemas.microsoft.com/office/powerpoint/2010/main" val="2505505920"/>
       </p:ext>
     </p:extLst>
   </p:cSld>
@@ -5717,141 +6213,82 @@
           <p:cNvPr id="2" name="Titel 1">
             <a:extLst>
               <a:ext uri="{FF2B5EF4-FFF2-40B4-BE49-F238E27FC236}">
-                <a16:creationId xmlns:a16="http://schemas.microsoft.com/office/drawing/2014/main" id="{6771848D-1E70-E48B-5C6D-951BC6041598}"/>
-              </a:ext>
-            </a:extLst>
-          </p:cNvPr>
-          <p:cNvSpPr>
-            <a:spLocks noGrp="1"/>
-          </p:cNvSpPr>
-          <p:nvPr>
-            <p:ph type="title"/>
+                <a16:creationId xmlns:a16="http://schemas.microsoft.com/office/drawing/2014/main" id="{61AC2841-EC8A-1BA6-D70A-7B843AF87BEF}"/>
+              </a:ext>
+            </a:extLst>
+          </p:cNvPr>
+          <p:cNvSpPr>
+            <a:spLocks noGrp="1"/>
+          </p:cNvSpPr>
+          <p:nvPr>
+            <p:ph type="ctrTitle"/>
           </p:nvPr>
         </p:nvSpPr>
         <p:spPr/>
         <p:txBody>
+          <a:bodyPr>
+            <a:normAutofit fontScale="90000"/>
+          </a:bodyPr>
+          <a:lstStyle/>
+          <a:p>
+            <a:r>
+              <a:rPr lang="de-DE" dirty="0"/>
+              <a:t>Teil 1</a:t>
+            </a:r>
+            <a:br>
+              <a:rPr lang="de-DE" dirty="0"/>
+            </a:br>
+            <a:r>
+              <a:rPr lang="de-DE" dirty="0"/>
+              <a:t>Installation der virtuellen Maschinen</a:t>
+            </a:r>
+          </a:p>
+        </p:txBody>
+      </p:sp>
+      <p:sp>
+        <p:nvSpPr>
+          <p:cNvPr id="3" name="Untertitel 2">
+            <a:extLst>
+              <a:ext uri="{FF2B5EF4-FFF2-40B4-BE49-F238E27FC236}">
+                <a16:creationId xmlns:a16="http://schemas.microsoft.com/office/drawing/2014/main" id="{FB2020CD-EBC6-748F-1AD6-DBF8E8960A6B}"/>
+              </a:ext>
+            </a:extLst>
+          </p:cNvPr>
+          <p:cNvSpPr>
+            <a:spLocks noGrp="1"/>
+          </p:cNvSpPr>
+          <p:nvPr>
+            <p:ph type="subTitle" idx="1"/>
+          </p:nvPr>
+        </p:nvSpPr>
+        <p:spPr/>
+        <p:txBody>
           <a:bodyPr/>
           <a:lstStyle/>
           <a:p>
             <a:r>
               <a:rPr lang="de-DE" dirty="0"/>
-              <a:t>Ziel</a:t>
-            </a:r>
-          </a:p>
-        </p:txBody>
-      </p:sp>
-      <p:sp>
-        <p:nvSpPr>
-          <p:cNvPr id="3" name="Inhaltsplatzhalter 2">
-            <a:extLst>
-              <a:ext uri="{FF2B5EF4-FFF2-40B4-BE49-F238E27FC236}">
-                <a16:creationId xmlns:a16="http://schemas.microsoft.com/office/drawing/2014/main" id="{C6B47590-B943-D19C-BC30-9C11A54E6BFE}"/>
-              </a:ext>
-            </a:extLst>
-          </p:cNvPr>
-          <p:cNvSpPr>
-            <a:spLocks noGrp="1"/>
-          </p:cNvSpPr>
-          <p:nvPr>
-            <p:ph idx="1"/>
-          </p:nvPr>
-        </p:nvSpPr>
-        <p:spPr/>
-        <p:txBody>
-          <a:bodyPr/>
-          <a:lstStyle/>
-          <a:p>
-            <a:r>
-              <a:rPr lang="de-DE" dirty="0"/>
-              <a:t>Installation eines </a:t>
+              <a:t>Dr. Georg Pietrek</a:t>
+            </a:r>
+          </a:p>
+          <a:p>
+            <a:r>
+              <a:rPr lang="de-DE" dirty="0"/>
+              <a:t>Timo Kästner, Can </a:t>
             </a:r>
             <a:r>
               <a:rPr lang="de-DE" dirty="0" err="1"/>
-              <a:t>Kubernetes</a:t>
-            </a:r>
-            <a:r>
-              <a:rPr lang="de-DE" dirty="0"/>
-              <a:t>-Clusters auf dem lokalen Rechner</a:t>
-            </a:r>
-          </a:p>
-          <a:p>
-            <a:pPr lvl="1"/>
-            <a:r>
-              <a:rPr lang="de-DE" dirty="0"/>
-              <a:t>Wichtig: Cluster = </a:t>
-            </a:r>
-            <a:r>
-              <a:rPr lang="de-DE" b="1" dirty="0"/>
-              <a:t>mehr als ein </a:t>
-            </a:r>
-            <a:r>
-              <a:rPr lang="de-DE" dirty="0" err="1"/>
-              <a:t>Node</a:t>
-            </a:r>
-            <a:r>
-              <a:rPr lang="de-DE" dirty="0"/>
-              <a:t>!</a:t>
-            </a:r>
-          </a:p>
-          <a:p>
-            <a:pPr lvl="1"/>
-            <a:endParaRPr lang="de-DE" dirty="0"/>
-          </a:p>
-          <a:p>
-            <a:r>
-              <a:rPr lang="de-DE" dirty="0"/>
-              <a:t>Warum?</a:t>
-            </a:r>
-          </a:p>
-          <a:p>
-            <a:pPr lvl="1"/>
-            <a:r>
-              <a:rPr lang="de-DE" dirty="0"/>
-              <a:t>Grundbegriffe/Prinzipien von </a:t>
-            </a:r>
-            <a:r>
-              <a:rPr lang="de-DE" dirty="0" err="1"/>
-              <a:t>Kubernetes</a:t>
-            </a:r>
-            <a:r>
-              <a:rPr lang="de-DE" dirty="0"/>
-              <a:t> kennenlernen</a:t>
-            </a:r>
-          </a:p>
-          <a:p>
-            <a:pPr lvl="1"/>
-            <a:r>
-              <a:rPr lang="de-DE" dirty="0"/>
-              <a:t>Experimentieren mit den Funktionen von </a:t>
-            </a:r>
-            <a:r>
-              <a:rPr lang="de-DE" dirty="0" err="1"/>
-              <a:t>Kubernetes</a:t>
-            </a:r>
-            <a:r>
-              <a:rPr lang="de-DE" dirty="0"/>
-              <a:t> ohne dafür externe Ressourcen (Cloud) zu benötigen</a:t>
-            </a:r>
-          </a:p>
-          <a:p>
-            <a:pPr lvl="2"/>
-            <a:r>
-              <a:rPr lang="de-DE" dirty="0"/>
-              <a:t>Autoskalierung</a:t>
-            </a:r>
-          </a:p>
-          <a:p>
-            <a:pPr lvl="2"/>
-            <a:r>
-              <a:rPr lang="de-DE" dirty="0"/>
-              <a:t>Ausfallsicherheit</a:t>
-            </a:r>
-          </a:p>
-          <a:p>
-            <a:pPr lvl="2"/>
-            <a:r>
-              <a:rPr lang="de-DE" dirty="0"/>
-              <a:t>…</a:t>
+              <a:t>Büyükburc</a:t>
+            </a:r>
+            <a:r>
+              <a:rPr lang="de-DE" dirty="0"/>
+              <a:t>, Yannick Poggel</a:t>
+            </a:r>
+          </a:p>
+          <a:p>
+            <a:r>
+              <a:rPr lang="de-DE" dirty="0"/>
+              <a:t>16.3.2023</a:t>
             </a:r>
           </a:p>
         </p:txBody>
@@ -5859,7 +6296,7 @@
     </p:spTree>
     <p:extLst>
       <p:ext uri="{BB962C8B-B14F-4D97-AF65-F5344CB8AC3E}">
-        <p14:creationId xmlns:p14="http://schemas.microsoft.com/office/powerpoint/2010/main" val="2632417734"/>
+        <p14:creationId xmlns:p14="http://schemas.microsoft.com/office/powerpoint/2010/main" val="3079428281"/>
       </p:ext>
     </p:extLst>
   </p:cSld>
@@ -5909,7 +6346,7 @@
           <a:p>
             <a:r>
               <a:rPr lang="de-DE" dirty="0"/>
-              <a:t>Wie machen wir das?</a:t>
+              <a:t>Ziel</a:t>
             </a:r>
           </a:p>
         </p:txBody>
@@ -5937,14 +6374,26 @@
           <a:p>
             <a:r>
               <a:rPr lang="de-DE" dirty="0"/>
-              <a:t>Virtuelle Maschinen</a:t>
+              <a:t>Installation eines </a:t>
+            </a:r>
+            <a:r>
+              <a:rPr lang="de-DE" dirty="0" err="1"/>
+              <a:t>Kubernetes</a:t>
+            </a:r>
+            <a:r>
+              <a:rPr lang="de-DE" dirty="0"/>
+              <a:t>-Clusters auf dem lokalen Rechner</a:t>
             </a:r>
           </a:p>
           <a:p>
             <a:pPr lvl="1"/>
             <a:r>
               <a:rPr lang="de-DE" dirty="0"/>
-              <a:t>Master </a:t>
+              <a:t>Wichtig: Cluster = </a:t>
+            </a:r>
+            <a:r>
+              <a:rPr lang="de-DE" b="1" dirty="0"/>
+              <a:t>mehr als ein </a:t>
             </a:r>
             <a:r>
               <a:rPr lang="de-DE" dirty="0" err="1"/>
@@ -5952,141 +6401,76 @@
             </a:r>
             <a:r>
               <a:rPr lang="de-DE" dirty="0"/>
-              <a:t> (</a:t>
-            </a:r>
-            <a:r>
-              <a:rPr lang="de-DE" dirty="0" err="1">
-                <a:latin typeface="Courier New" panose="02070309020205020404" pitchFamily="49" charset="0"/>
-                <a:cs typeface="Courier New" panose="02070309020205020404" pitchFamily="49" charset="0"/>
-              </a:rPr>
-              <a:t>master</a:t>
-            </a:r>
-            <a:r>
-              <a:rPr lang="de-DE" dirty="0"/>
-              <a:t>)</a:t>
+              <a:t>!</a:t>
+            </a:r>
+          </a:p>
+          <a:p>
+            <a:pPr lvl="1"/>
+            <a:endParaRPr lang="de-DE" dirty="0"/>
+          </a:p>
+          <a:p>
+            <a:r>
+              <a:rPr lang="de-DE" dirty="0"/>
+              <a:t>Warum?</a:t>
+            </a:r>
+          </a:p>
+          <a:p>
+            <a:pPr lvl="1"/>
+            <a:r>
+              <a:rPr lang="de-DE" dirty="0"/>
+              <a:t>Grundbegriffe/Prinzipien von </a:t>
+            </a:r>
+            <a:r>
+              <a:rPr lang="de-DE" dirty="0" err="1"/>
+              <a:t>Kubernetes</a:t>
+            </a:r>
+            <a:r>
+              <a:rPr lang="de-DE" dirty="0"/>
+              <a:t> kennenlernen</a:t>
+            </a:r>
+          </a:p>
+          <a:p>
+            <a:pPr lvl="1"/>
+            <a:r>
+              <a:rPr lang="de-DE" dirty="0"/>
+              <a:t>Experimentieren mit den Funktionen von </a:t>
+            </a:r>
+            <a:r>
+              <a:rPr lang="de-DE" dirty="0" err="1"/>
+              <a:t>Kubernetes</a:t>
+            </a:r>
+            <a:r>
+              <a:rPr lang="de-DE" dirty="0"/>
+              <a:t> ohne dafür externe Ressourcen (Cloud) zu benötigen</a:t>
             </a:r>
           </a:p>
           <a:p>
             <a:pPr lvl="2"/>
             <a:r>
               <a:rPr lang="de-DE" dirty="0"/>
-              <a:t>Hier läuft die Control Plane</a:t>
+              <a:t>Autoskalierung</a:t>
             </a:r>
           </a:p>
           <a:p>
             <a:pPr lvl="2"/>
             <a:r>
               <a:rPr lang="de-DE" dirty="0"/>
-              <a:t>Gleichzeitig auch </a:t>
-            </a:r>
-            <a:r>
-              <a:rPr lang="de-DE" dirty="0" err="1"/>
-              <a:t>Worker</a:t>
-            </a:r>
-            <a:r>
-              <a:rPr lang="de-DE" dirty="0"/>
-              <a:t> (würde man in Produktion nicht machen)</a:t>
+              <a:t>Ausfallsicherheit</a:t>
             </a:r>
           </a:p>
           <a:p>
             <a:pPr lvl="2"/>
-            <a:endParaRPr lang="de-DE" dirty="0"/>
-          </a:p>
-          <a:p>
-            <a:pPr lvl="1"/>
-            <a:r>
-              <a:rPr lang="de-DE" dirty="0"/>
-              <a:t>1-n </a:t>
-            </a:r>
-            <a:r>
-              <a:rPr lang="de-DE" dirty="0" err="1"/>
-              <a:t>Worker</a:t>
-            </a:r>
-            <a:r>
-              <a:rPr lang="de-DE" dirty="0"/>
-              <a:t> Nodes (</a:t>
-            </a:r>
-            <a:r>
-              <a:rPr lang="de-DE" dirty="0">
-                <a:latin typeface="Courier New" panose="02070309020205020404" pitchFamily="49" charset="0"/>
-                <a:cs typeface="Courier New" panose="02070309020205020404" pitchFamily="49" charset="0"/>
-              </a:rPr>
-              <a:t>worker1</a:t>
-            </a:r>
-            <a:r>
-              <a:rPr lang="de-DE" dirty="0"/>
-              <a:t>, </a:t>
-            </a:r>
-            <a:r>
-              <a:rPr lang="de-DE" dirty="0">
-                <a:latin typeface="Courier New" panose="02070309020205020404" pitchFamily="49" charset="0"/>
-                <a:cs typeface="Courier New" panose="02070309020205020404" pitchFamily="49" charset="0"/>
-              </a:rPr>
-              <a:t>worker2</a:t>
-            </a:r>
-            <a:r>
-              <a:rPr lang="de-DE" dirty="0"/>
-              <a:t>)</a:t>
-            </a:r>
-          </a:p>
-          <a:p>
-            <a:pPr lvl="2"/>
-            <a:r>
-              <a:rPr lang="de-DE" dirty="0"/>
-              <a:t>Weitere Nodes, um Pods verteilen zu können</a:t>
-            </a:r>
-          </a:p>
-          <a:p>
-            <a:pPr lvl="2"/>
-            <a:endParaRPr lang="de-DE" dirty="0"/>
-          </a:p>
-          <a:p>
-            <a:pPr lvl="1"/>
-            <a:r>
-              <a:rPr lang="de-DE" dirty="0"/>
-              <a:t>Datenbank-Server (</a:t>
-            </a:r>
-            <a:r>
-              <a:rPr lang="de-DE" dirty="0" err="1">
-                <a:latin typeface="Courier New" panose="02070309020205020404" pitchFamily="49" charset="0"/>
-                <a:cs typeface="Courier New" panose="02070309020205020404" pitchFamily="49" charset="0"/>
-              </a:rPr>
-              <a:t>db</a:t>
-            </a:r>
-            <a:r>
-              <a:rPr lang="de-DE" dirty="0"/>
-              <a:t>)</a:t>
-            </a:r>
-          </a:p>
-          <a:p>
-            <a:pPr lvl="2"/>
-            <a:r>
-              <a:rPr lang="de-DE" dirty="0"/>
-              <a:t>PostgreSQL</a:t>
-            </a:r>
-          </a:p>
-          <a:p>
-            <a:pPr lvl="2"/>
-            <a:r>
-              <a:rPr lang="de-DE" dirty="0" err="1"/>
-              <a:t>Keycloak</a:t>
-            </a:r>
-            <a:endParaRPr lang="de-DE" dirty="0"/>
-          </a:p>
-          <a:p>
-            <a:pPr lvl="2"/>
-            <a:endParaRPr lang="de-DE" dirty="0"/>
-          </a:p>
-          <a:p>
-            <a:pPr lvl="3"/>
-            <a:endParaRPr lang="de-DE" dirty="0"/>
+            <a:r>
+              <a:rPr lang="de-DE" dirty="0"/>
+              <a:t>…</a:t>
+            </a:r>
           </a:p>
         </p:txBody>
       </p:sp>
     </p:spTree>
     <p:extLst>
       <p:ext uri="{BB962C8B-B14F-4D97-AF65-F5344CB8AC3E}">
-        <p14:creationId xmlns:p14="http://schemas.microsoft.com/office/powerpoint/2010/main" val="1247536268"/>
+        <p14:creationId xmlns:p14="http://schemas.microsoft.com/office/powerpoint/2010/main" val="2632417734"/>
       </p:ext>
     </p:extLst>
   </p:cSld>
@@ -6118,7 +6502,7 @@
           <p:cNvPr id="2" name="Titel 1">
             <a:extLst>
               <a:ext uri="{FF2B5EF4-FFF2-40B4-BE49-F238E27FC236}">
-                <a16:creationId xmlns:a16="http://schemas.microsoft.com/office/drawing/2014/main" id="{29EBF5F8-FABC-4343-1F06-2225742EAB41}"/>
+                <a16:creationId xmlns:a16="http://schemas.microsoft.com/office/drawing/2014/main" id="{6771848D-1E70-E48B-5C6D-951BC6041598}"/>
               </a:ext>
             </a:extLst>
           </p:cNvPr>
@@ -6136,7 +6520,7 @@
           <a:p>
             <a:r>
               <a:rPr lang="de-DE" dirty="0"/>
-              <a:t>Was nehmen wir dafür?</a:t>
+              <a:t>Wie machen wir das?</a:t>
             </a:r>
           </a:p>
         </p:txBody>
@@ -6146,7 +6530,7 @@
           <p:cNvPr id="3" name="Inhaltsplatzhalter 2">
             <a:extLst>
               <a:ext uri="{FF2B5EF4-FFF2-40B4-BE49-F238E27FC236}">
-                <a16:creationId xmlns:a16="http://schemas.microsoft.com/office/drawing/2014/main" id="{7BB03110-E053-8252-FC21-2F6729858E1F}"/>
+                <a16:creationId xmlns:a16="http://schemas.microsoft.com/office/drawing/2014/main" id="{C6B47590-B943-D19C-BC30-9C11A54E6BFE}"/>
               </a:ext>
             </a:extLst>
           </p:cNvPr>
@@ -6171,11 +6555,22 @@
             <a:pPr lvl="1"/>
             <a:r>
               <a:rPr lang="de-DE" dirty="0"/>
-              <a:t>Multipass (von </a:t>
+              <a:t>Master </a:t>
             </a:r>
             <a:r>
               <a:rPr lang="de-DE" dirty="0" err="1"/>
-              <a:t>Canonical</a:t>
+              <a:t>Node</a:t>
+            </a:r>
+            <a:r>
+              <a:rPr lang="de-DE" dirty="0"/>
+              <a:t> (</a:t>
+            </a:r>
+            <a:r>
+              <a:rPr lang="de-DE" dirty="0" err="1">
+                <a:latin typeface="Courier New" panose="02070309020205020404" pitchFamily="49" charset="0"/>
+                <a:cs typeface="Courier New" panose="02070309020205020404" pitchFamily="49" charset="0"/>
+              </a:rPr>
+              <a:t>master</a:t>
             </a:r>
             <a:r>
               <a:rPr lang="de-DE" dirty="0"/>
@@ -6183,74 +6578,118 @@
             </a:r>
           </a:p>
           <a:p>
+            <a:pPr lvl="2"/>
+            <a:r>
+              <a:rPr lang="de-DE" dirty="0"/>
+              <a:t>Hier läuft die Control Plane</a:t>
+            </a:r>
+          </a:p>
+          <a:p>
+            <a:pPr lvl="2"/>
+            <a:r>
+              <a:rPr lang="de-DE" dirty="0"/>
+              <a:t>Gleichzeitig auch </a:t>
+            </a:r>
+            <a:r>
+              <a:rPr lang="de-DE" dirty="0" err="1"/>
+              <a:t>Worker</a:t>
+            </a:r>
+            <a:r>
+              <a:rPr lang="de-DE" dirty="0"/>
+              <a:t> (würde man in Produktion nicht machen)</a:t>
+            </a:r>
+          </a:p>
+          <a:p>
+            <a:pPr lvl="2"/>
+            <a:endParaRPr lang="de-DE" dirty="0"/>
+          </a:p>
+          <a:p>
             <a:pPr lvl="1"/>
             <a:r>
               <a:rPr lang="de-DE" dirty="0"/>
-              <a:t>Ubuntu VMs (Server)</a:t>
-            </a:r>
+              <a:t>1-n </a:t>
+            </a:r>
+            <a:r>
+              <a:rPr lang="de-DE" dirty="0" err="1"/>
+              <a:t>Worker</a:t>
+            </a:r>
+            <a:r>
+              <a:rPr lang="de-DE" dirty="0"/>
+              <a:t> Nodes (</a:t>
+            </a:r>
+            <a:r>
+              <a:rPr lang="de-DE" dirty="0">
+                <a:latin typeface="Courier New" panose="02070309020205020404" pitchFamily="49" charset="0"/>
+                <a:cs typeface="Courier New" panose="02070309020205020404" pitchFamily="49" charset="0"/>
+              </a:rPr>
+              <a:t>worker1</a:t>
+            </a:r>
+            <a:r>
+              <a:rPr lang="de-DE" dirty="0"/>
+              <a:t>, </a:t>
+            </a:r>
+            <a:r>
+              <a:rPr lang="de-DE" dirty="0">
+                <a:latin typeface="Courier New" panose="02070309020205020404" pitchFamily="49" charset="0"/>
+                <a:cs typeface="Courier New" panose="02070309020205020404" pitchFamily="49" charset="0"/>
+              </a:rPr>
+              <a:t>worker2</a:t>
+            </a:r>
+            <a:r>
+              <a:rPr lang="de-DE" dirty="0"/>
+              <a:t>)</a:t>
+            </a:r>
+          </a:p>
+          <a:p>
+            <a:pPr lvl="2"/>
+            <a:r>
+              <a:rPr lang="de-DE" dirty="0"/>
+              <a:t>Weitere Nodes, um Pods verteilen zu können</a:t>
+            </a:r>
+          </a:p>
+          <a:p>
+            <a:pPr lvl="2"/>
+            <a:endParaRPr lang="de-DE" dirty="0"/>
           </a:p>
           <a:p>
             <a:pPr lvl="1"/>
+            <a:r>
+              <a:rPr lang="de-DE" dirty="0"/>
+              <a:t>Datenbank-Server (</a:t>
+            </a:r>
+            <a:r>
+              <a:rPr lang="de-DE" dirty="0" err="1">
+                <a:latin typeface="Courier New" panose="02070309020205020404" pitchFamily="49" charset="0"/>
+                <a:cs typeface="Courier New" panose="02070309020205020404" pitchFamily="49" charset="0"/>
+              </a:rPr>
+              <a:t>db</a:t>
+            </a:r>
+            <a:r>
+              <a:rPr lang="de-DE" dirty="0"/>
+              <a:t>)</a:t>
+            </a:r>
+          </a:p>
+          <a:p>
+            <a:pPr lvl="2"/>
+            <a:r>
+              <a:rPr lang="de-DE" dirty="0"/>
+              <a:t>PostgreSQL</a:t>
+            </a:r>
+          </a:p>
+          <a:p>
+            <a:pPr lvl="2"/>
+            <a:r>
+              <a:rPr lang="de-DE" dirty="0" err="1"/>
+              <a:t>Keycloak</a:t>
+            </a:r>
             <a:endParaRPr lang="de-DE" dirty="0"/>
           </a:p>
           <a:p>
-            <a:r>
-              <a:rPr lang="de-DE" dirty="0" err="1"/>
-              <a:t>Kubernetes</a:t>
-            </a:r>
+            <a:pPr lvl="2"/>
             <a:endParaRPr lang="de-DE" dirty="0"/>
           </a:p>
           <a:p>
-            <a:pPr lvl="1"/>
-            <a:r>
-              <a:rPr lang="de-DE" dirty="0"/>
-              <a:t>MicroK8S (auch von </a:t>
-            </a:r>
-            <a:r>
-              <a:rPr lang="de-DE" dirty="0" err="1"/>
-              <a:t>Canonical</a:t>
-            </a:r>
-            <a:r>
-              <a:rPr lang="de-DE" dirty="0"/>
-              <a:t>)</a:t>
-            </a:r>
-          </a:p>
-          <a:p>
-            <a:pPr lvl="1"/>
-            <a:endParaRPr lang="de-DE" dirty="0"/>
-          </a:p>
-          <a:p>
-            <a:r>
-              <a:rPr lang="de-DE" dirty="0"/>
-              <a:t>Container Images</a:t>
-            </a:r>
-          </a:p>
-          <a:p>
-            <a:pPr lvl="1"/>
-            <a:r>
-              <a:rPr lang="de-DE" dirty="0"/>
-              <a:t>Microservices aus dem Java-Starter: </a:t>
-            </a:r>
-            <a:r>
-              <a:rPr lang="de-DE" dirty="0" err="1"/>
-              <a:t>shop</a:t>
-            </a:r>
-            <a:r>
-              <a:rPr lang="de-DE" dirty="0"/>
-              <a:t>, </a:t>
-            </a:r>
-            <a:r>
-              <a:rPr lang="de-DE" dirty="0" err="1"/>
-              <a:t>person</a:t>
-            </a:r>
-            <a:r>
-              <a:rPr lang="de-DE" dirty="0"/>
-              <a:t>, </a:t>
-            </a:r>
-            <a:r>
-              <a:rPr lang="de-DE" dirty="0" err="1"/>
-              <a:t>auftrag</a:t>
-            </a:r>
+            <a:pPr lvl="3"/>
             <a:endParaRPr lang="de-DE" dirty="0"/>
           </a:p>
         </p:txBody>
@@ -6258,7 +6697,7 @@
     </p:spTree>
     <p:extLst>
       <p:ext uri="{BB962C8B-B14F-4D97-AF65-F5344CB8AC3E}">
-        <p14:creationId xmlns:p14="http://schemas.microsoft.com/office/powerpoint/2010/main" val="59066083"/>
+        <p14:creationId xmlns:p14="http://schemas.microsoft.com/office/powerpoint/2010/main" val="1247536268"/>
       </p:ext>
     </p:extLst>
   </p:cSld>
@@ -6290,7 +6729,7 @@
           <p:cNvPr id="2" name="Titel 1">
             <a:extLst>
               <a:ext uri="{FF2B5EF4-FFF2-40B4-BE49-F238E27FC236}">
-                <a16:creationId xmlns:a16="http://schemas.microsoft.com/office/drawing/2014/main" id="{54472761-F6BA-A4DF-6E97-094AE60B729E}"/>
+                <a16:creationId xmlns:a16="http://schemas.microsoft.com/office/drawing/2014/main" id="{29EBF5F8-FABC-4343-1F06-2225742EAB41}"/>
               </a:ext>
             </a:extLst>
           </p:cNvPr>
@@ -6308,7 +6747,7 @@
           <a:p>
             <a:r>
               <a:rPr lang="de-DE" dirty="0"/>
-              <a:t>Virtuelle Maschinen mit multipass</a:t>
+              <a:t>Was nehmen wir dafür?</a:t>
             </a:r>
           </a:p>
         </p:txBody>
@@ -6318,7 +6757,7 @@
           <p:cNvPr id="3" name="Inhaltsplatzhalter 2">
             <a:extLst>
               <a:ext uri="{FF2B5EF4-FFF2-40B4-BE49-F238E27FC236}">
-                <a16:creationId xmlns:a16="http://schemas.microsoft.com/office/drawing/2014/main" id="{A6C84D30-D395-411D-5201-F8BC8F103909}"/>
+                <a16:creationId xmlns:a16="http://schemas.microsoft.com/office/drawing/2014/main" id="{7BB03110-E053-8252-FC21-2F6729858E1F}"/>
               </a:ext>
             </a:extLst>
           </p:cNvPr>
@@ -6336,21 +6775,29 @@
           <a:p>
             <a:r>
               <a:rPr lang="de-DE" dirty="0"/>
-              <a:t>Download: </a:t>
-            </a:r>
-            <a:r>
-              <a:rPr lang="de-DE" dirty="0">
-                <a:hlinkClick r:id="rId2"/>
-              </a:rPr>
-              <a:t>https://multipass.run/install</a:t>
-            </a:r>
-            <a:endParaRPr lang="de-DE" dirty="0"/>
+              <a:t>Virtuelle Maschinen</a:t>
+            </a:r>
           </a:p>
           <a:p>
             <a:pPr lvl="1"/>
             <a:r>
               <a:rPr lang="de-DE" dirty="0"/>
-              <a:t>Bitte runterladen und installieren!</a:t>
+              <a:t>Multipass (von </a:t>
+            </a:r>
+            <a:r>
+              <a:rPr lang="de-DE" dirty="0" err="1"/>
+              <a:t>Canonical</a:t>
+            </a:r>
+            <a:r>
+              <a:rPr lang="de-DE" dirty="0"/>
+              <a:t>)</a:t>
+            </a:r>
+          </a:p>
+          <a:p>
+            <a:pPr lvl="1"/>
+            <a:r>
+              <a:rPr lang="de-DE" dirty="0"/>
+              <a:t>Ubuntu VMs (Server)</a:t>
             </a:r>
           </a:p>
           <a:p>
@@ -6359,20 +6806,70 @@
           </a:p>
           <a:p>
             <a:r>
-              <a:rPr lang="de-DE" dirty="0"/>
-              <a:t>Ab hier gilt: alle gezeigten Kommandos werden in einem Terminal eingegeben!</a:t>
-            </a:r>
-            <a:endParaRPr lang="de-DE" dirty="0">
-              <a:latin typeface="Courier New" panose="02070309020205020404" pitchFamily="49" charset="0"/>
-              <a:cs typeface="Courier New" panose="02070309020205020404" pitchFamily="49" charset="0"/>
-            </a:endParaRPr>
+              <a:rPr lang="de-DE" dirty="0" err="1"/>
+              <a:t>Kubernetes</a:t>
+            </a:r>
+            <a:endParaRPr lang="de-DE" dirty="0"/>
+          </a:p>
+          <a:p>
+            <a:pPr lvl="1"/>
+            <a:r>
+              <a:rPr lang="de-DE" dirty="0"/>
+              <a:t>MicroK8S (auch von </a:t>
+            </a:r>
+            <a:r>
+              <a:rPr lang="de-DE" dirty="0" err="1"/>
+              <a:t>Canonical</a:t>
+            </a:r>
+            <a:r>
+              <a:rPr lang="de-DE" dirty="0"/>
+              <a:t>)</a:t>
+            </a:r>
+          </a:p>
+          <a:p>
+            <a:pPr lvl="1"/>
+            <a:endParaRPr lang="de-DE" dirty="0"/>
+          </a:p>
+          <a:p>
+            <a:r>
+              <a:rPr lang="de-DE" dirty="0"/>
+              <a:t>Container Images</a:t>
+            </a:r>
+          </a:p>
+          <a:p>
+            <a:pPr lvl="1"/>
+            <a:r>
+              <a:rPr lang="de-DE" dirty="0"/>
+              <a:t>Microservices aus dem Java-Starter: </a:t>
+            </a:r>
+            <a:r>
+              <a:rPr lang="de-DE" dirty="0" err="1"/>
+              <a:t>shop</a:t>
+            </a:r>
+            <a:r>
+              <a:rPr lang="de-DE" dirty="0"/>
+              <a:t>, </a:t>
+            </a:r>
+            <a:r>
+              <a:rPr lang="de-DE" dirty="0" err="1"/>
+              <a:t>person</a:t>
+            </a:r>
+            <a:r>
+              <a:rPr lang="de-DE" dirty="0"/>
+              <a:t>, </a:t>
+            </a:r>
+            <a:r>
+              <a:rPr lang="de-DE" dirty="0" err="1"/>
+              <a:t>auftrag</a:t>
+            </a:r>
+            <a:endParaRPr lang="de-DE" dirty="0"/>
           </a:p>
         </p:txBody>
       </p:sp>
     </p:spTree>
     <p:extLst>
       <p:ext uri="{BB962C8B-B14F-4D97-AF65-F5344CB8AC3E}">
-        <p14:creationId xmlns:p14="http://schemas.microsoft.com/office/powerpoint/2010/main" val="2715330188"/>
+        <p14:creationId xmlns:p14="http://schemas.microsoft.com/office/powerpoint/2010/main" val="59066083"/>
       </p:ext>
     </p:extLst>
   </p:cSld>
@@ -6448,98 +6945,45 @@
           <a:bodyPr/>
           <a:lstStyle/>
           <a:p>
+            <a:r>
+              <a:rPr lang="de-DE" dirty="0"/>
+              <a:t>Download: </a:t>
+            </a:r>
+            <a:r>
+              <a:rPr lang="de-DE" dirty="0">
+                <a:hlinkClick r:id="rId2"/>
+              </a:rPr>
+              <a:t>https://multipass.run/install</a:t>
+            </a:r>
+            <a:endParaRPr lang="de-DE" dirty="0"/>
+          </a:p>
+          <a:p>
+            <a:pPr lvl="1"/>
+            <a:r>
+              <a:rPr lang="de-DE" dirty="0"/>
+              <a:t>Bitte runterladen und installieren!</a:t>
+            </a:r>
+          </a:p>
+          <a:p>
             <a:pPr lvl="1"/>
             <a:endParaRPr lang="de-DE" dirty="0"/>
           </a:p>
           <a:p>
             <a:r>
               <a:rPr lang="de-DE" dirty="0"/>
-              <a:t>Virtuelle Maschine erstellen und starten</a:t>
-            </a:r>
-          </a:p>
-          <a:p>
-            <a:pPr marL="457200" lvl="1" indent="0">
-              <a:buNone/>
-            </a:pPr>
-            <a:r>
-              <a:rPr lang="de-DE" dirty="0">
-                <a:latin typeface="Courier New" panose="02070309020205020404" pitchFamily="49" charset="0"/>
-                <a:cs typeface="Courier New" panose="02070309020205020404" pitchFamily="49" charset="0"/>
-              </a:rPr>
-              <a:t>multipass launch --name </a:t>
-            </a:r>
-            <a:r>
-              <a:rPr lang="de-DE" dirty="0" err="1">
-                <a:latin typeface="Courier New" panose="02070309020205020404" pitchFamily="49" charset="0"/>
-                <a:cs typeface="Courier New" panose="02070309020205020404" pitchFamily="49" charset="0"/>
-              </a:rPr>
-              <a:t>master</a:t>
-            </a:r>
-            <a:r>
-              <a:rPr lang="de-DE" dirty="0">
-                <a:latin typeface="Courier New" panose="02070309020205020404" pitchFamily="49" charset="0"/>
-                <a:cs typeface="Courier New" panose="02070309020205020404" pitchFamily="49" charset="0"/>
-              </a:rPr>
-              <a:t> --</a:t>
-            </a:r>
-            <a:r>
-              <a:rPr lang="de-DE" dirty="0" err="1">
-                <a:latin typeface="Courier New" panose="02070309020205020404" pitchFamily="49" charset="0"/>
-                <a:cs typeface="Courier New" panose="02070309020205020404" pitchFamily="49" charset="0"/>
-              </a:rPr>
-              <a:t>cpus</a:t>
-            </a:r>
-            <a:r>
-              <a:rPr lang="de-DE" dirty="0">
-                <a:latin typeface="Courier New" panose="02070309020205020404" pitchFamily="49" charset="0"/>
-                <a:cs typeface="Courier New" panose="02070309020205020404" pitchFamily="49" charset="0"/>
-              </a:rPr>
-              <a:t> 2 --memory 4G --disk 20G </a:t>
-            </a:r>
-            <a:r>
-              <a:rPr lang="de-DE" dirty="0" err="1">
-                <a:latin typeface="Courier New" panose="02070309020205020404" pitchFamily="49" charset="0"/>
-                <a:cs typeface="Courier New" panose="02070309020205020404" pitchFamily="49" charset="0"/>
-              </a:rPr>
-              <a:t>lts</a:t>
+              <a:t>Ab hier gilt: alle gezeigten Kommandos werden in einem Terminal eingegeben!</a:t>
             </a:r>
             <a:endParaRPr lang="de-DE" dirty="0">
               <a:latin typeface="Courier New" panose="02070309020205020404" pitchFamily="49" charset="0"/>
               <a:cs typeface="Courier New" panose="02070309020205020404" pitchFamily="49" charset="0"/>
             </a:endParaRPr>
           </a:p>
-          <a:p>
-            <a:pPr marL="457200" lvl="1" indent="0">
-              <a:buNone/>
-            </a:pPr>
-            <a:endParaRPr lang="de-DE" dirty="0">
-              <a:latin typeface="Courier New" panose="02070309020205020404" pitchFamily="49" charset="0"/>
-              <a:cs typeface="Courier New" panose="02070309020205020404" pitchFamily="49" charset="0"/>
-            </a:endParaRPr>
-          </a:p>
-          <a:p>
-            <a:r>
-              <a:rPr lang="de-DE" dirty="0">
-                <a:cs typeface="Courier New" panose="02070309020205020404" pitchFamily="49" charset="0"/>
-              </a:rPr>
-              <a:t>Wenn der Host stark genug ist, kann man auch mehr Memory oder mehr CPUs spendieren</a:t>
-            </a:r>
-          </a:p>
-          <a:p>
-            <a:pPr lvl="1"/>
-            <a:r>
-              <a:rPr lang="de-DE" dirty="0">
-                <a:cs typeface="Courier New" panose="02070309020205020404" pitchFamily="49" charset="0"/>
-              </a:rPr>
-              <a:t>Die hier benutzten Werte sind für einen Host mit 16 GB RAM und 8 Kernen ausgelegt</a:t>
-            </a:r>
-          </a:p>
         </p:txBody>
       </p:sp>
     </p:spTree>
     <p:extLst>
       <p:ext uri="{BB962C8B-B14F-4D97-AF65-F5344CB8AC3E}">
-        <p14:creationId xmlns:p14="http://schemas.microsoft.com/office/powerpoint/2010/main" val="972499456"/>
+        <p14:creationId xmlns:p14="http://schemas.microsoft.com/office/powerpoint/2010/main" val="2715330188"/>
       </p:ext>
     </p:extLst>
   </p:cSld>
@@ -6612,77 +7056,236 @@
         </p:nvSpPr>
         <p:spPr/>
         <p:txBody>
-          <a:bodyPr/>
-          <a:lstStyle/>
-          <a:p>
-            <a:pPr lvl="1"/>
-            <a:endParaRPr lang="de-DE" dirty="0"/>
-          </a:p>
-          <a:p>
-            <a:r>
-              <a:rPr lang="de-DE" dirty="0"/>
-              <a:t>IP-Adresse der virtuellen von </a:t>
-            </a:r>
-            <a:r>
-              <a:rPr lang="de-DE" dirty="0" err="1">
+          <a:bodyPr>
+            <a:normAutofit/>
+          </a:bodyPr>
+          <a:lstStyle/>
+          <a:p>
+            <a:r>
+              <a:rPr lang="de-DE" dirty="0"/>
+              <a:t>Virtuelle Maschinen erstellen und starten</a:t>
+            </a:r>
+          </a:p>
+          <a:p>
+            <a:pPr marL="0" indent="0">
+              <a:buNone/>
+            </a:pPr>
+            <a:r>
+              <a:rPr lang="de-DE" sz="2000" dirty="0">
+                <a:latin typeface="Courier New" panose="02070309020205020404" pitchFamily="49" charset="0"/>
+                <a:cs typeface="Courier New" panose="02070309020205020404" pitchFamily="49" charset="0"/>
+              </a:rPr>
+              <a:t>   </a:t>
+            </a:r>
+            <a:r>
+              <a:rPr lang="de-DE" sz="1800" dirty="0">
+                <a:latin typeface="Courier New" panose="02070309020205020404" pitchFamily="49" charset="0"/>
+                <a:cs typeface="Courier New" panose="02070309020205020404" pitchFamily="49" charset="0"/>
+              </a:rPr>
+              <a:t>multipass launch --name </a:t>
+            </a:r>
+            <a:r>
+              <a:rPr lang="de-DE" sz="1800" dirty="0" err="1">
                 <a:latin typeface="Courier New" panose="02070309020205020404" pitchFamily="49" charset="0"/>
                 <a:cs typeface="Courier New" panose="02070309020205020404" pitchFamily="49" charset="0"/>
               </a:rPr>
               <a:t>master</a:t>
             </a:r>
             <a:r>
-              <a:rPr lang="de-DE" dirty="0"/>
-              <a:t> bestimmen</a:t>
-            </a:r>
-          </a:p>
-          <a:p>
-            <a:pPr marL="457200" lvl="1" indent="0">
-              <a:buNone/>
-            </a:pPr>
-            <a:r>
-              <a:rPr lang="de-DE" dirty="0">
-                <a:latin typeface="Courier New" panose="02070309020205020404" pitchFamily="49" charset="0"/>
-                <a:cs typeface="Courier New" panose="02070309020205020404" pitchFamily="49" charset="0"/>
-              </a:rPr>
-              <a:t>multipass </a:t>
-            </a:r>
-            <a:r>
-              <a:rPr lang="de-DE" dirty="0" err="1">
-                <a:latin typeface="Courier New" panose="02070309020205020404" pitchFamily="49" charset="0"/>
-                <a:cs typeface="Courier New" panose="02070309020205020404" pitchFamily="49" charset="0"/>
-              </a:rPr>
-              <a:t>list</a:t>
-            </a:r>
-            <a:endParaRPr lang="de-DE" dirty="0">
+              <a:rPr lang="de-DE" sz="1800" dirty="0">
+                <a:latin typeface="Courier New" panose="02070309020205020404" pitchFamily="49" charset="0"/>
+                <a:cs typeface="Courier New" panose="02070309020205020404" pitchFamily="49" charset="0"/>
+              </a:rPr>
+              <a:t> --</a:t>
+            </a:r>
+            <a:r>
+              <a:rPr lang="de-DE" sz="1800" dirty="0" err="1">
+                <a:latin typeface="Courier New" panose="02070309020205020404" pitchFamily="49" charset="0"/>
+                <a:cs typeface="Courier New" panose="02070309020205020404" pitchFamily="49" charset="0"/>
+              </a:rPr>
+              <a:t>cpus</a:t>
+            </a:r>
+            <a:r>
+              <a:rPr lang="de-DE" sz="1800" dirty="0">
+                <a:latin typeface="Courier New" panose="02070309020205020404" pitchFamily="49" charset="0"/>
+                <a:cs typeface="Courier New" panose="02070309020205020404" pitchFamily="49" charset="0"/>
+              </a:rPr>
+              <a:t> 2 --memory 4G --disk 20G </a:t>
+            </a:r>
+            <a:r>
+              <a:rPr lang="de-DE" sz="1800" dirty="0" err="1">
+                <a:latin typeface="Courier New" panose="02070309020205020404" pitchFamily="49" charset="0"/>
+                <a:cs typeface="Courier New" panose="02070309020205020404" pitchFamily="49" charset="0"/>
+              </a:rPr>
+              <a:t>lts</a:t>
+            </a:r>
+            <a:endParaRPr lang="de-DE" sz="1800" dirty="0">
               <a:latin typeface="Courier New" panose="02070309020205020404" pitchFamily="49" charset="0"/>
               <a:cs typeface="Courier New" panose="02070309020205020404" pitchFamily="49" charset="0"/>
             </a:endParaRPr>
           </a:p>
           <a:p>
-            <a:pPr marL="457200" lvl="1" indent="0">
+            <a:pPr marL="0" indent="0">
               <a:buNone/>
             </a:pPr>
-            <a:endParaRPr lang="de-DE" dirty="0">
+            <a:r>
+              <a:rPr lang="de-DE" sz="2000" dirty="0">
+                <a:latin typeface="Courier New" panose="02070309020205020404" pitchFamily="49" charset="0"/>
+                <a:cs typeface="Courier New" panose="02070309020205020404" pitchFamily="49" charset="0"/>
+              </a:rPr>
+              <a:t>   </a:t>
+            </a:r>
+            <a:r>
+              <a:rPr lang="de-DE" sz="1800" dirty="0">
+                <a:latin typeface="Courier New" panose="02070309020205020404" pitchFamily="49" charset="0"/>
+                <a:cs typeface="Courier New" panose="02070309020205020404" pitchFamily="49" charset="0"/>
+              </a:rPr>
+              <a:t>multipass launch --name worker1 --</a:t>
+            </a:r>
+            <a:r>
+              <a:rPr lang="de-DE" sz="1800" dirty="0" err="1">
+                <a:latin typeface="Courier New" panose="02070309020205020404" pitchFamily="49" charset="0"/>
+                <a:cs typeface="Courier New" panose="02070309020205020404" pitchFamily="49" charset="0"/>
+              </a:rPr>
+              <a:t>cpus</a:t>
+            </a:r>
+            <a:r>
+              <a:rPr lang="de-DE" sz="1800" dirty="0">
+                <a:latin typeface="Courier New" panose="02070309020205020404" pitchFamily="49" charset="0"/>
+                <a:cs typeface="Courier New" panose="02070309020205020404" pitchFamily="49" charset="0"/>
+              </a:rPr>
+              <a:t> 2 --memory 4G --disk 20G </a:t>
+            </a:r>
+            <a:r>
+              <a:rPr lang="de-DE" sz="1800" dirty="0" err="1">
+                <a:latin typeface="Courier New" panose="02070309020205020404" pitchFamily="49" charset="0"/>
+                <a:cs typeface="Courier New" panose="02070309020205020404" pitchFamily="49" charset="0"/>
+              </a:rPr>
+              <a:t>lts</a:t>
+            </a:r>
+            <a:endParaRPr lang="de-DE" sz="1800" dirty="0">
               <a:latin typeface="Courier New" panose="02070309020205020404" pitchFamily="49" charset="0"/>
               <a:cs typeface="Courier New" panose="02070309020205020404" pitchFamily="49" charset="0"/>
             </a:endParaRPr>
           </a:p>
           <a:p>
-            <a:endParaRPr lang="de-DE" dirty="0">
+            <a:pPr marL="0" indent="0">
+              <a:buNone/>
+            </a:pPr>
+            <a:r>
+              <a:rPr lang="de-DE" sz="2000" dirty="0">
+                <a:latin typeface="Courier New" panose="02070309020205020404" pitchFamily="49" charset="0"/>
+                <a:cs typeface="Courier New" panose="02070309020205020404" pitchFamily="49" charset="0"/>
+              </a:rPr>
+              <a:t>   </a:t>
+            </a:r>
+            <a:r>
+              <a:rPr lang="de-DE" sz="1800" dirty="0">
+                <a:latin typeface="Courier New" panose="02070309020205020404" pitchFamily="49" charset="0"/>
+                <a:cs typeface="Courier New" panose="02070309020205020404" pitchFamily="49" charset="0"/>
+              </a:rPr>
+              <a:t>multipass launch --name worker2 --</a:t>
+            </a:r>
+            <a:r>
+              <a:rPr lang="de-DE" sz="1800" dirty="0" err="1">
+                <a:latin typeface="Courier New" panose="02070309020205020404" pitchFamily="49" charset="0"/>
+                <a:cs typeface="Courier New" panose="02070309020205020404" pitchFamily="49" charset="0"/>
+              </a:rPr>
+              <a:t>cpus</a:t>
+            </a:r>
+            <a:r>
+              <a:rPr lang="de-DE" sz="1800" dirty="0">
+                <a:latin typeface="Courier New" panose="02070309020205020404" pitchFamily="49" charset="0"/>
+                <a:cs typeface="Courier New" panose="02070309020205020404" pitchFamily="49" charset="0"/>
+              </a:rPr>
+              <a:t> 2 --memory 4G --disk 20G </a:t>
+            </a:r>
+            <a:r>
+              <a:rPr lang="de-DE" sz="1800" dirty="0" err="1">
+                <a:latin typeface="Courier New" panose="02070309020205020404" pitchFamily="49" charset="0"/>
+                <a:cs typeface="Courier New" panose="02070309020205020404" pitchFamily="49" charset="0"/>
+              </a:rPr>
+              <a:t>lts</a:t>
+            </a:r>
+            <a:endParaRPr lang="de-DE" sz="1800" dirty="0">
+              <a:latin typeface="Courier New" panose="02070309020205020404" pitchFamily="49" charset="0"/>
               <a:cs typeface="Courier New" panose="02070309020205020404" pitchFamily="49" charset="0"/>
             </a:endParaRPr>
           </a:p>
           <a:p>
-            <a:endParaRPr lang="de-DE" dirty="0">
+            <a:pPr marL="0" indent="0">
+              <a:buNone/>
+            </a:pPr>
+            <a:r>
+              <a:rPr lang="de-DE" sz="2000" dirty="0">
+                <a:latin typeface="Courier New" panose="02070309020205020404" pitchFamily="49" charset="0"/>
+                <a:cs typeface="Courier New" panose="02070309020205020404" pitchFamily="49" charset="0"/>
+              </a:rPr>
+              <a:t>   </a:t>
+            </a:r>
+            <a:r>
+              <a:rPr lang="de-DE" sz="1800" dirty="0">
+                <a:latin typeface="Courier New" panose="02070309020205020404" pitchFamily="49" charset="0"/>
+                <a:cs typeface="Courier New" panose="02070309020205020404" pitchFamily="49" charset="0"/>
+              </a:rPr>
+              <a:t>multipass launch --name </a:t>
+            </a:r>
+            <a:r>
+              <a:rPr lang="de-DE" sz="1800" dirty="0" err="1">
+                <a:latin typeface="Courier New" panose="02070309020205020404" pitchFamily="49" charset="0"/>
+                <a:cs typeface="Courier New" panose="02070309020205020404" pitchFamily="49" charset="0"/>
+              </a:rPr>
+              <a:t>db</a:t>
+            </a:r>
+            <a:r>
+              <a:rPr lang="de-DE" sz="1800" dirty="0">
+                <a:latin typeface="Courier New" panose="02070309020205020404" pitchFamily="49" charset="0"/>
+                <a:cs typeface="Courier New" panose="02070309020205020404" pitchFamily="49" charset="0"/>
+              </a:rPr>
+              <a:t> --</a:t>
+            </a:r>
+            <a:r>
+              <a:rPr lang="de-DE" sz="1800" dirty="0" err="1">
+                <a:latin typeface="Courier New" panose="02070309020205020404" pitchFamily="49" charset="0"/>
+                <a:cs typeface="Courier New" panose="02070309020205020404" pitchFamily="49" charset="0"/>
+              </a:rPr>
+              <a:t>cpus</a:t>
+            </a:r>
+            <a:r>
+              <a:rPr lang="de-DE" sz="1800" dirty="0">
+                <a:latin typeface="Courier New" panose="02070309020205020404" pitchFamily="49" charset="0"/>
+                <a:cs typeface="Courier New" panose="02070309020205020404" pitchFamily="49" charset="0"/>
+              </a:rPr>
+              <a:t> 2 --memory 2G --disk 20G </a:t>
+            </a:r>
+            <a:r>
+              <a:rPr lang="de-DE" sz="1800" dirty="0" err="1">
+                <a:latin typeface="Courier New" panose="02070309020205020404" pitchFamily="49" charset="0"/>
+                <a:cs typeface="Courier New" panose="02070309020205020404" pitchFamily="49" charset="0"/>
+              </a:rPr>
+              <a:t>lts</a:t>
+            </a:r>
+            <a:endParaRPr lang="de-DE" sz="1800" dirty="0">
+              <a:latin typeface="Courier New" panose="02070309020205020404" pitchFamily="49" charset="0"/>
               <a:cs typeface="Courier New" panose="02070309020205020404" pitchFamily="49" charset="0"/>
             </a:endParaRPr>
           </a:p>
           <a:p>
+            <a:pPr marL="0" indent="0">
+              <a:buNone/>
+            </a:pPr>
+            <a:endParaRPr lang="de-DE" sz="1800" dirty="0">
+              <a:latin typeface="Courier New" panose="02070309020205020404" pitchFamily="49" charset="0"/>
+              <a:cs typeface="Courier New" panose="02070309020205020404" pitchFamily="49" charset="0"/>
+            </a:endParaRPr>
+          </a:p>
+          <a:p>
+            <a:pPr lvl="1"/>
             <a:r>
               <a:rPr lang="de-DE" dirty="0">
                 <a:cs typeface="Courier New" panose="02070309020205020404" pitchFamily="49" charset="0"/>
               </a:rPr>
-              <a:t>Diese IP-Adresse merken!</a:t>
+              <a:t>Wenn der Host stark genug ist, kann man auch mehr Memory oder mehr CPUs spendieren</a:t>
             </a:r>
           </a:p>
           <a:p>
@@ -6691,97 +7294,15 @@
               <a:rPr lang="de-DE" dirty="0">
                 <a:cs typeface="Courier New" panose="02070309020205020404" pitchFamily="49" charset="0"/>
               </a:rPr>
-              <a:t>Wir brauchen die Adresse später</a:t>
-            </a:r>
-          </a:p>
-        </p:txBody>
-      </p:sp>
-      <p:pic>
-        <p:nvPicPr>
-          <p:cNvPr id="4" name="Grafik 3">
-            <a:extLst>
-              <a:ext uri="{FF2B5EF4-FFF2-40B4-BE49-F238E27FC236}">
-                <a16:creationId xmlns:a16="http://schemas.microsoft.com/office/drawing/2014/main" id="{9970DE89-6AFA-4274-CEDB-BE1FB97D8532}"/>
-              </a:ext>
-            </a:extLst>
-          </p:cNvPr>
-          <p:cNvPicPr>
-            <a:picLocks noChangeAspect="1"/>
-          </p:cNvPicPr>
-          <p:nvPr/>
-        </p:nvPicPr>
-        <p:blipFill>
-          <a:blip r:embed="rId2"/>
-          <a:stretch>
-            <a:fillRect/>
-          </a:stretch>
-        </p:blipFill>
-        <p:spPr>
-          <a:xfrm>
-            <a:off x="1423072" y="3429000"/>
-            <a:ext cx="9345855" cy="800576"/>
-          </a:xfrm>
-          <a:prstGeom prst="rect">
-            <a:avLst/>
-          </a:prstGeom>
-        </p:spPr>
-      </p:pic>
-      <p:sp>
-        <p:nvSpPr>
-          <p:cNvPr id="5" name="Oval 4">
-            <a:extLst>
-              <a:ext uri="{FF2B5EF4-FFF2-40B4-BE49-F238E27FC236}">
-                <a16:creationId xmlns:a16="http://schemas.microsoft.com/office/drawing/2014/main" id="{E6AEEE8E-7792-64F8-C8B9-B4BBD549ED4D}"/>
-              </a:ext>
-            </a:extLst>
-          </p:cNvPr>
-          <p:cNvSpPr/>
-          <p:nvPr/>
-        </p:nvSpPr>
-        <p:spPr>
-          <a:xfrm>
-            <a:off x="6332220" y="3817620"/>
-            <a:ext cx="1897380" cy="411956"/>
-          </a:xfrm>
-          <a:prstGeom prst="ellipse">
-            <a:avLst/>
-          </a:prstGeom>
-          <a:noFill/>
-          <a:ln w="38100">
-            <a:solidFill>
-              <a:srgbClr val="FF0000"/>
-            </a:solidFill>
-          </a:ln>
-        </p:spPr>
-        <p:style>
-          <a:lnRef idx="2">
-            <a:schemeClr val="accent1">
-              <a:shade val="50000"/>
-            </a:schemeClr>
-          </a:lnRef>
-          <a:fillRef idx="1">
-            <a:schemeClr val="accent1"/>
-          </a:fillRef>
-          <a:effectRef idx="0">
-            <a:schemeClr val="accent1"/>
-          </a:effectRef>
-          <a:fontRef idx="minor">
-            <a:schemeClr val="lt1"/>
-          </a:fontRef>
-        </p:style>
-        <p:txBody>
-          <a:bodyPr rtlCol="0" anchor="ctr"/>
-          <a:lstStyle/>
-          <a:p>
-            <a:pPr algn="ctr"/>
-            <a:endParaRPr lang="de-DE"/>
+              <a:t>Die hier benutzten Werte sind für einen Host mit 16 GB RAM und 8 Kernen ausgelegt</a:t>
+            </a:r>
           </a:p>
         </p:txBody>
       </p:sp>
     </p:spTree>
     <p:extLst>
       <p:ext uri="{BB962C8B-B14F-4D97-AF65-F5344CB8AC3E}">
-        <p14:creationId xmlns:p14="http://schemas.microsoft.com/office/powerpoint/2010/main" val="3401149698"/>
+        <p14:creationId xmlns:p14="http://schemas.microsoft.com/office/powerpoint/2010/main" val="972499456"/>
       </p:ext>
     </p:extLst>
   </p:cSld>
@@ -6813,7 +7334,7 @@
           <p:cNvPr id="2" name="Titel 1">
             <a:extLst>
               <a:ext uri="{FF2B5EF4-FFF2-40B4-BE49-F238E27FC236}">
-                <a16:creationId xmlns:a16="http://schemas.microsoft.com/office/drawing/2014/main" id="{54472761-F6BA-A4DF-6E97-094AE60B729E}"/>
+                <a16:creationId xmlns:a16="http://schemas.microsoft.com/office/drawing/2014/main" id="{97B81511-FD40-5DFB-A11C-439D47FC7E4E}"/>
               </a:ext>
             </a:extLst>
           </p:cNvPr>
@@ -6849,7 +7370,7 @@
           <p:cNvPr id="3" name="Inhaltsplatzhalter 2">
             <a:extLst>
               <a:ext uri="{FF2B5EF4-FFF2-40B4-BE49-F238E27FC236}">
-                <a16:creationId xmlns:a16="http://schemas.microsoft.com/office/drawing/2014/main" id="{A6C84D30-D395-411D-5201-F8BC8F103909}"/>
+                <a16:creationId xmlns:a16="http://schemas.microsoft.com/office/drawing/2014/main" id="{D60DEAA2-318F-E89B-9305-4E4F17176745}"/>
               </a:ext>
             </a:extLst>
           </p:cNvPr>
@@ -6868,12 +7389,8 @@
           <a:lstStyle/>
           <a:p>
             <a:r>
-              <a:rPr lang="de-DE" dirty="0" err="1"/>
-              <a:t>Kubernetes</a:t>
-            </a:r>
-            <a:r>
-              <a:rPr lang="de-DE" dirty="0"/>
-              <a:t> installieren (1):</a:t>
+              <a:rPr lang="de-DE" dirty="0"/>
+              <a:t>IP-Adressen in Hosts-Datei eintragen	</a:t>
             </a:r>
           </a:p>
           <a:p>
@@ -6892,21 +7409,7 @@
                 <a:latin typeface="Courier New" panose="02070309020205020404" pitchFamily="49" charset="0"/>
                 <a:cs typeface="Courier New" panose="02070309020205020404" pitchFamily="49" charset="0"/>
               </a:rPr>
-              <a:t>shell</a:t>
-            </a:r>
-            <a:r>
-              <a:rPr lang="de-DE" sz="2400" dirty="0">
-                <a:latin typeface="Courier New" panose="02070309020205020404" pitchFamily="49" charset="0"/>
-                <a:cs typeface="Courier New" panose="02070309020205020404" pitchFamily="49" charset="0"/>
-              </a:rPr>
-              <a:t> </a:t>
-            </a:r>
-            <a:r>
-              <a:rPr lang="de-DE" sz="2400" dirty="0" err="1">
-                <a:latin typeface="Courier New" panose="02070309020205020404" pitchFamily="49" charset="0"/>
-                <a:cs typeface="Courier New" panose="02070309020205020404" pitchFamily="49" charset="0"/>
-              </a:rPr>
-              <a:t>master</a:t>
+              <a:t>list</a:t>
             </a:r>
             <a:endParaRPr lang="de-DE" sz="2400" dirty="0">
               <a:latin typeface="Courier New" panose="02070309020205020404" pitchFamily="49" charset="0"/>
@@ -6917,176 +7420,223 @@
             <a:pPr marL="0" indent="0">
               <a:buNone/>
             </a:pPr>
-            <a:r>
-              <a:rPr lang="de-DE" sz="2400" dirty="0">
-                <a:latin typeface="Courier New" panose="02070309020205020404" pitchFamily="49" charset="0"/>
-                <a:cs typeface="Courier New" panose="02070309020205020404" pitchFamily="49" charset="0"/>
-              </a:rPr>
-              <a:t>	</a:t>
-            </a:r>
-            <a:r>
-              <a:rPr lang="de-DE" sz="2400" dirty="0" err="1">
-                <a:latin typeface="Courier New" panose="02070309020205020404" pitchFamily="49" charset="0"/>
-                <a:cs typeface="Courier New" panose="02070309020205020404" pitchFamily="49" charset="0"/>
-              </a:rPr>
-              <a:t>sudo</a:t>
-            </a:r>
-            <a:r>
-              <a:rPr lang="de-DE" sz="2400" dirty="0">
-                <a:latin typeface="Courier New" panose="02070309020205020404" pitchFamily="49" charset="0"/>
-                <a:cs typeface="Courier New" panose="02070309020205020404" pitchFamily="49" charset="0"/>
-              </a:rPr>
-              <a:t> </a:t>
-            </a:r>
-            <a:r>
-              <a:rPr lang="de-DE" sz="2400" dirty="0" err="1">
-                <a:latin typeface="Courier New" panose="02070309020205020404" pitchFamily="49" charset="0"/>
-                <a:cs typeface="Courier New" panose="02070309020205020404" pitchFamily="49" charset="0"/>
-              </a:rPr>
-              <a:t>snap</a:t>
-            </a:r>
-            <a:r>
-              <a:rPr lang="de-DE" sz="2400" dirty="0">
-                <a:latin typeface="Courier New" panose="02070309020205020404" pitchFamily="49" charset="0"/>
-                <a:cs typeface="Courier New" panose="02070309020205020404" pitchFamily="49" charset="0"/>
-              </a:rPr>
-              <a:t> </a:t>
-            </a:r>
-            <a:r>
-              <a:rPr lang="de-DE" sz="2400" dirty="0" err="1">
-                <a:latin typeface="Courier New" panose="02070309020205020404" pitchFamily="49" charset="0"/>
-                <a:cs typeface="Courier New" panose="02070309020205020404" pitchFamily="49" charset="0"/>
-              </a:rPr>
-              <a:t>install</a:t>
-            </a:r>
-            <a:r>
-              <a:rPr lang="de-DE" sz="2400" dirty="0">
-                <a:latin typeface="Courier New" panose="02070309020205020404" pitchFamily="49" charset="0"/>
-                <a:cs typeface="Courier New" panose="02070309020205020404" pitchFamily="49" charset="0"/>
-              </a:rPr>
-              <a:t> microk8s --classic</a:t>
-            </a:r>
-          </a:p>
-          <a:p>
-            <a:pPr marL="0" indent="0">
-              <a:buNone/>
-            </a:pPr>
-            <a:r>
-              <a:rPr lang="de-DE" sz="2400" dirty="0">
-                <a:latin typeface="Courier New" panose="02070309020205020404" pitchFamily="49" charset="0"/>
-                <a:cs typeface="Courier New" panose="02070309020205020404" pitchFamily="49" charset="0"/>
-              </a:rPr>
-              <a:t>	</a:t>
-            </a:r>
-            <a:r>
-              <a:rPr lang="de-DE" sz="2400" dirty="0" err="1">
-                <a:latin typeface="Courier New" panose="02070309020205020404" pitchFamily="49" charset="0"/>
-                <a:cs typeface="Courier New" panose="02070309020205020404" pitchFamily="49" charset="0"/>
-              </a:rPr>
-              <a:t>sudo</a:t>
-            </a:r>
-            <a:r>
-              <a:rPr lang="de-DE" sz="2400" dirty="0">
-                <a:latin typeface="Courier New" panose="02070309020205020404" pitchFamily="49" charset="0"/>
-                <a:cs typeface="Courier New" panose="02070309020205020404" pitchFamily="49" charset="0"/>
-              </a:rPr>
-              <a:t> </a:t>
-            </a:r>
-            <a:r>
-              <a:rPr lang="de-DE" sz="2400" dirty="0" err="1">
-                <a:latin typeface="Courier New" panose="02070309020205020404" pitchFamily="49" charset="0"/>
-                <a:cs typeface="Courier New" panose="02070309020205020404" pitchFamily="49" charset="0"/>
-              </a:rPr>
-              <a:t>usermod</a:t>
-            </a:r>
-            <a:r>
-              <a:rPr lang="de-DE" sz="2400" dirty="0">
-                <a:latin typeface="Courier New" panose="02070309020205020404" pitchFamily="49" charset="0"/>
-                <a:cs typeface="Courier New" panose="02070309020205020404" pitchFamily="49" charset="0"/>
-              </a:rPr>
-              <a:t> -a -G microk8s $USER</a:t>
-            </a:r>
-          </a:p>
-          <a:p>
-            <a:pPr marL="0" indent="0">
-              <a:buNone/>
-            </a:pPr>
-            <a:r>
-              <a:rPr lang="de-DE" sz="2400" dirty="0">
-                <a:latin typeface="Courier New" panose="02070309020205020404" pitchFamily="49" charset="0"/>
-                <a:cs typeface="Courier New" panose="02070309020205020404" pitchFamily="49" charset="0"/>
-              </a:rPr>
-              <a:t>	</a:t>
-            </a:r>
-            <a:r>
-              <a:rPr lang="de-DE" sz="2400" dirty="0" err="1">
-                <a:latin typeface="Courier New" panose="02070309020205020404" pitchFamily="49" charset="0"/>
-                <a:cs typeface="Courier New" panose="02070309020205020404" pitchFamily="49" charset="0"/>
-              </a:rPr>
-              <a:t>sudo</a:t>
-            </a:r>
-            <a:r>
-              <a:rPr lang="de-DE" sz="2400" dirty="0">
-                <a:latin typeface="Courier New" panose="02070309020205020404" pitchFamily="49" charset="0"/>
-                <a:cs typeface="Courier New" panose="02070309020205020404" pitchFamily="49" charset="0"/>
-              </a:rPr>
-              <a:t> </a:t>
-            </a:r>
-            <a:r>
-              <a:rPr lang="de-DE" sz="2400" dirty="0" err="1">
-                <a:latin typeface="Courier New" panose="02070309020205020404" pitchFamily="49" charset="0"/>
-                <a:cs typeface="Courier New" panose="02070309020205020404" pitchFamily="49" charset="0"/>
-              </a:rPr>
-              <a:t>shutdown</a:t>
-            </a:r>
-            <a:r>
-              <a:rPr lang="de-DE" sz="2400" dirty="0">
-                <a:latin typeface="Courier New" panose="02070309020205020404" pitchFamily="49" charset="0"/>
-                <a:cs typeface="Courier New" panose="02070309020205020404" pitchFamily="49" charset="0"/>
-              </a:rPr>
-              <a:t> -</a:t>
-            </a:r>
-            <a:r>
-              <a:rPr lang="de-DE" sz="2400" dirty="0" err="1">
-                <a:latin typeface="Courier New" panose="02070309020205020404" pitchFamily="49" charset="0"/>
-                <a:cs typeface="Courier New" panose="02070309020205020404" pitchFamily="49" charset="0"/>
-              </a:rPr>
-              <a:t>r</a:t>
-            </a:r>
-            <a:r>
-              <a:rPr lang="de-DE" sz="2400" dirty="0">
-                <a:latin typeface="Courier New" panose="02070309020205020404" pitchFamily="49" charset="0"/>
-                <a:cs typeface="Courier New" panose="02070309020205020404" pitchFamily="49" charset="0"/>
-              </a:rPr>
-              <a:t> </a:t>
-            </a:r>
-            <a:r>
-              <a:rPr lang="de-DE" sz="2400" dirty="0" err="1">
-                <a:latin typeface="Courier New" panose="02070309020205020404" pitchFamily="49" charset="0"/>
-                <a:cs typeface="Courier New" panose="02070309020205020404" pitchFamily="49" charset="0"/>
-              </a:rPr>
-              <a:t>now</a:t>
-            </a:r>
             <a:endParaRPr lang="de-DE" sz="2400" dirty="0">
               <a:latin typeface="Courier New" panose="02070309020205020404" pitchFamily="49" charset="0"/>
               <a:cs typeface="Courier New" panose="02070309020205020404" pitchFamily="49" charset="0"/>
             </a:endParaRPr>
           </a:p>
           <a:p>
-            <a:pPr lvl="1"/>
-            <a:r>
-              <a:rPr lang="de-DE" dirty="0">
-                <a:cs typeface="Courier New" panose="02070309020205020404" pitchFamily="49" charset="0"/>
-              </a:rPr>
-              <a:t>Kurz warten: VM startet neu</a:t>
-            </a:r>
-          </a:p>
-        </p:txBody>
-      </p:sp>
+            <a:pPr marL="0" indent="0">
+              <a:buNone/>
+            </a:pPr>
+            <a:endParaRPr lang="de-DE" sz="2400" dirty="0">
+              <a:latin typeface="Courier New" panose="02070309020205020404" pitchFamily="49" charset="0"/>
+              <a:cs typeface="Courier New" panose="02070309020205020404" pitchFamily="49" charset="0"/>
+            </a:endParaRPr>
+          </a:p>
+          <a:p>
+            <a:pPr marL="0" indent="0">
+              <a:buNone/>
+            </a:pPr>
+            <a:endParaRPr lang="de-DE" sz="2400" dirty="0">
+              <a:latin typeface="Courier New" panose="02070309020205020404" pitchFamily="49" charset="0"/>
+              <a:cs typeface="Courier New" panose="02070309020205020404" pitchFamily="49" charset="0"/>
+            </a:endParaRPr>
+          </a:p>
+          <a:p>
+            <a:pPr marL="0" indent="0">
+              <a:buNone/>
+            </a:pPr>
+            <a:r>
+              <a:rPr lang="de-DE" sz="2400" dirty="0">
+                <a:latin typeface="Courier New" panose="02070309020205020404" pitchFamily="49" charset="0"/>
+                <a:cs typeface="Courier New" panose="02070309020205020404" pitchFamily="49" charset="0"/>
+              </a:rPr>
+              <a:t>	</a:t>
+            </a:r>
+          </a:p>
+          <a:p>
+            <a:pPr marL="0" indent="0">
+              <a:buNone/>
+            </a:pPr>
+            <a:r>
+              <a:rPr lang="de-DE" sz="2400" dirty="0">
+                <a:latin typeface="Courier New" panose="02070309020205020404" pitchFamily="49" charset="0"/>
+                <a:cs typeface="Courier New" panose="02070309020205020404" pitchFamily="49" charset="0"/>
+              </a:rPr>
+              <a:t>	multipass </a:t>
+            </a:r>
+            <a:r>
+              <a:rPr lang="de-DE" sz="2400" dirty="0" err="1">
+                <a:latin typeface="Courier New" panose="02070309020205020404" pitchFamily="49" charset="0"/>
+                <a:cs typeface="Courier New" panose="02070309020205020404" pitchFamily="49" charset="0"/>
+              </a:rPr>
+              <a:t>shell</a:t>
+            </a:r>
+            <a:r>
+              <a:rPr lang="de-DE" sz="2400" dirty="0">
+                <a:latin typeface="Courier New" panose="02070309020205020404" pitchFamily="49" charset="0"/>
+                <a:cs typeface="Courier New" panose="02070309020205020404" pitchFamily="49" charset="0"/>
+              </a:rPr>
+              <a:t> </a:t>
+            </a:r>
+            <a:r>
+              <a:rPr lang="de-DE" sz="2400" dirty="0" err="1">
+                <a:latin typeface="Courier New" panose="02070309020205020404" pitchFamily="49" charset="0"/>
+                <a:cs typeface="Courier New" panose="02070309020205020404" pitchFamily="49" charset="0"/>
+              </a:rPr>
+              <a:t>master</a:t>
+            </a:r>
+            <a:endParaRPr lang="de-DE" sz="2400" dirty="0">
+              <a:latin typeface="Courier New" panose="02070309020205020404" pitchFamily="49" charset="0"/>
+              <a:cs typeface="Courier New" panose="02070309020205020404" pitchFamily="49" charset="0"/>
+            </a:endParaRPr>
+          </a:p>
+          <a:p>
+            <a:pPr marL="0" indent="0">
+              <a:buNone/>
+            </a:pPr>
+            <a:r>
+              <a:rPr lang="de-DE" sz="2400" dirty="0">
+                <a:latin typeface="Courier New" panose="02070309020205020404" pitchFamily="49" charset="0"/>
+                <a:cs typeface="Courier New" panose="02070309020205020404" pitchFamily="49" charset="0"/>
+              </a:rPr>
+              <a:t>	</a:t>
+            </a:r>
+            <a:r>
+              <a:rPr lang="de-DE" sz="2400" dirty="0" err="1">
+                <a:latin typeface="Courier New" panose="02070309020205020404" pitchFamily="49" charset="0"/>
+                <a:cs typeface="Courier New" panose="02070309020205020404" pitchFamily="49" charset="0"/>
+              </a:rPr>
+              <a:t>sudo</a:t>
+            </a:r>
+            <a:r>
+              <a:rPr lang="de-DE" sz="2400" dirty="0">
+                <a:latin typeface="Courier New" panose="02070309020205020404" pitchFamily="49" charset="0"/>
+                <a:cs typeface="Courier New" panose="02070309020205020404" pitchFamily="49" charset="0"/>
+              </a:rPr>
+              <a:t> vi /</a:t>
+            </a:r>
+            <a:r>
+              <a:rPr lang="de-DE" sz="2400" dirty="0" err="1">
+                <a:latin typeface="Courier New" panose="02070309020205020404" pitchFamily="49" charset="0"/>
+                <a:cs typeface="Courier New" panose="02070309020205020404" pitchFamily="49" charset="0"/>
+              </a:rPr>
+              <a:t>etc</a:t>
+            </a:r>
+            <a:r>
+              <a:rPr lang="de-DE" sz="2400" dirty="0">
+                <a:latin typeface="Courier New" panose="02070309020205020404" pitchFamily="49" charset="0"/>
+                <a:cs typeface="Courier New" panose="02070309020205020404" pitchFamily="49" charset="0"/>
+              </a:rPr>
+              <a:t>/</a:t>
+            </a:r>
+            <a:r>
+              <a:rPr lang="de-DE" sz="2400" dirty="0" err="1">
+                <a:latin typeface="Courier New" panose="02070309020205020404" pitchFamily="49" charset="0"/>
+                <a:cs typeface="Courier New" panose="02070309020205020404" pitchFamily="49" charset="0"/>
+              </a:rPr>
+              <a:t>cloud</a:t>
+            </a:r>
+            <a:r>
+              <a:rPr lang="de-DE" sz="2400" dirty="0">
+                <a:latin typeface="Courier New" panose="02070309020205020404" pitchFamily="49" charset="0"/>
+                <a:cs typeface="Courier New" panose="02070309020205020404" pitchFamily="49" charset="0"/>
+              </a:rPr>
+              <a:t>/</a:t>
+            </a:r>
+            <a:r>
+              <a:rPr lang="de-DE" sz="2400" dirty="0" err="1">
+                <a:latin typeface="Courier New" panose="02070309020205020404" pitchFamily="49" charset="0"/>
+                <a:cs typeface="Courier New" panose="02070309020205020404" pitchFamily="49" charset="0"/>
+              </a:rPr>
+              <a:t>templates</a:t>
+            </a:r>
+            <a:r>
+              <a:rPr lang="de-DE" sz="2400" dirty="0">
+                <a:latin typeface="Courier New" panose="02070309020205020404" pitchFamily="49" charset="0"/>
+                <a:cs typeface="Courier New" panose="02070309020205020404" pitchFamily="49" charset="0"/>
+              </a:rPr>
+              <a:t>/</a:t>
+            </a:r>
+            <a:r>
+              <a:rPr lang="de-DE" sz="2400" dirty="0" err="1">
+                <a:latin typeface="Courier New" panose="02070309020205020404" pitchFamily="49" charset="0"/>
+                <a:cs typeface="Courier New" panose="02070309020205020404" pitchFamily="49" charset="0"/>
+              </a:rPr>
+              <a:t>hosts.debian.tmpl</a:t>
+            </a:r>
+            <a:endParaRPr lang="de-DE" sz="2400" dirty="0">
+              <a:latin typeface="Courier New" panose="02070309020205020404" pitchFamily="49" charset="0"/>
+              <a:cs typeface="Courier New" panose="02070309020205020404" pitchFamily="49" charset="0"/>
+            </a:endParaRPr>
+          </a:p>
+        </p:txBody>
+      </p:sp>
+      <p:pic>
+        <p:nvPicPr>
+          <p:cNvPr id="7" name="Grafik 6">
+            <a:extLst>
+              <a:ext uri="{FF2B5EF4-FFF2-40B4-BE49-F238E27FC236}">
+                <a16:creationId xmlns:a16="http://schemas.microsoft.com/office/drawing/2014/main" id="{C4C2B3E5-3DB5-B1F5-1E08-21EA9EB81FF0}"/>
+              </a:ext>
+            </a:extLst>
+          </p:cNvPr>
+          <p:cNvPicPr>
+            <a:picLocks noChangeAspect="1"/>
+          </p:cNvPicPr>
+          <p:nvPr/>
+        </p:nvPicPr>
+        <p:blipFill>
+          <a:blip r:embed="rId3"/>
+          <a:stretch>
+            <a:fillRect/>
+          </a:stretch>
+        </p:blipFill>
+        <p:spPr>
+          <a:xfrm>
+            <a:off x="4445000" y="5567112"/>
+            <a:ext cx="2901950" cy="962226"/>
+          </a:xfrm>
+          <a:prstGeom prst="rect">
+            <a:avLst/>
+          </a:prstGeom>
+        </p:spPr>
+      </p:pic>
+      <p:pic>
+        <p:nvPicPr>
+          <p:cNvPr id="6" name="Grafik 5">
+            <a:extLst>
+              <a:ext uri="{FF2B5EF4-FFF2-40B4-BE49-F238E27FC236}">
+                <a16:creationId xmlns:a16="http://schemas.microsoft.com/office/drawing/2014/main" id="{90CB199C-3DF3-D431-995A-55C20BBA7296}"/>
+              </a:ext>
+            </a:extLst>
+          </p:cNvPr>
+          <p:cNvPicPr>
+            <a:picLocks noChangeAspect="1"/>
+          </p:cNvPicPr>
+          <p:nvPr/>
+        </p:nvPicPr>
+        <p:blipFill>
+          <a:blip r:embed="rId4"/>
+          <a:stretch>
+            <a:fillRect/>
+          </a:stretch>
+        </p:blipFill>
+        <p:spPr>
+          <a:xfrm>
+            <a:off x="4521200" y="3124869"/>
+            <a:ext cx="6832600" cy="1143000"/>
+          </a:xfrm>
+          <a:prstGeom prst="rect">
+            <a:avLst/>
+          </a:prstGeom>
+        </p:spPr>
+      </p:pic>
     </p:spTree>
     <p:extLst>
       <p:ext uri="{BB962C8B-B14F-4D97-AF65-F5344CB8AC3E}">
-        <p14:creationId xmlns:p14="http://schemas.microsoft.com/office/powerpoint/2010/main" val="1270310899"/>
+        <p14:creationId xmlns:p14="http://schemas.microsoft.com/office/powerpoint/2010/main" val="2489378187"/>
       </p:ext>
     </p:extLst>
   </p:cSld>
@@ -7178,7 +7728,7 @@
             </a:r>
             <a:r>
               <a:rPr lang="de-DE" dirty="0"/>
-              <a:t> installieren (2):</a:t>
+              <a:t> installieren (1):</a:t>
             </a:r>
           </a:p>
           <a:p>
@@ -7190,14 +7740,14 @@
                 <a:latin typeface="Courier New" panose="02070309020205020404" pitchFamily="49" charset="0"/>
                 <a:cs typeface="Courier New" panose="02070309020205020404" pitchFamily="49" charset="0"/>
               </a:rPr>
-              <a:t>	multipass </a:t>
+              <a:t>	</a:t>
             </a:r>
             <a:r>
               <a:rPr lang="de-DE" sz="2400" dirty="0" err="1">
                 <a:latin typeface="Courier New" panose="02070309020205020404" pitchFamily="49" charset="0"/>
                 <a:cs typeface="Courier New" panose="02070309020205020404" pitchFamily="49" charset="0"/>
               </a:rPr>
-              <a:t>shell</a:t>
+              <a:t>sudo</a:t>
             </a:r>
             <a:r>
               <a:rPr lang="de-DE" sz="2400" dirty="0">
@@ -7211,7 +7761,129 @@
                 <a:latin typeface="Courier New" panose="02070309020205020404" pitchFamily="49" charset="0"/>
                 <a:cs typeface="Courier New" panose="02070309020205020404" pitchFamily="49" charset="0"/>
               </a:rPr>
-              <a:t>master</a:t>
+              <a:t>snap</a:t>
+            </a:r>
+            <a:r>
+              <a:rPr lang="de-DE" sz="2400" dirty="0">
+                <a:latin typeface="Courier New" panose="02070309020205020404" pitchFamily="49" charset="0"/>
+                <a:cs typeface="Courier New" panose="02070309020205020404" pitchFamily="49" charset="0"/>
+              </a:rPr>
+              <a:t> </a:t>
+            </a:r>
+            <a:r>
+              <a:rPr lang="de-DE" sz="2400" dirty="0" err="1">
+                <a:latin typeface="Courier New" panose="02070309020205020404" pitchFamily="49" charset="0"/>
+                <a:cs typeface="Courier New" panose="02070309020205020404" pitchFamily="49" charset="0"/>
+              </a:rPr>
+              <a:t>install</a:t>
+            </a:r>
+            <a:r>
+              <a:rPr lang="de-DE" sz="2400" dirty="0">
+                <a:latin typeface="Courier New" panose="02070309020205020404" pitchFamily="49" charset="0"/>
+                <a:cs typeface="Courier New" panose="02070309020205020404" pitchFamily="49" charset="0"/>
+              </a:rPr>
+              <a:t> microk8s --classic</a:t>
+            </a:r>
+          </a:p>
+          <a:p>
+            <a:pPr marL="0" indent="0">
+              <a:buNone/>
+            </a:pPr>
+            <a:r>
+              <a:rPr lang="de-DE" sz="2400" dirty="0">
+                <a:latin typeface="Courier New" panose="02070309020205020404" pitchFamily="49" charset="0"/>
+                <a:cs typeface="Courier New" panose="02070309020205020404" pitchFamily="49" charset="0"/>
+              </a:rPr>
+              <a:t>	</a:t>
+            </a:r>
+            <a:r>
+              <a:rPr lang="de-DE" sz="2400" dirty="0" err="1">
+                <a:latin typeface="Courier New" panose="02070309020205020404" pitchFamily="49" charset="0"/>
+                <a:cs typeface="Courier New" panose="02070309020205020404" pitchFamily="49" charset="0"/>
+              </a:rPr>
+              <a:t>sudo</a:t>
+            </a:r>
+            <a:r>
+              <a:rPr lang="de-DE" sz="2400" dirty="0">
+                <a:latin typeface="Courier New" panose="02070309020205020404" pitchFamily="49" charset="0"/>
+                <a:cs typeface="Courier New" panose="02070309020205020404" pitchFamily="49" charset="0"/>
+              </a:rPr>
+              <a:t> </a:t>
+            </a:r>
+            <a:r>
+              <a:rPr lang="de-DE" sz="2400" dirty="0" err="1">
+                <a:latin typeface="Courier New" panose="02070309020205020404" pitchFamily="49" charset="0"/>
+                <a:cs typeface="Courier New" panose="02070309020205020404" pitchFamily="49" charset="0"/>
+              </a:rPr>
+              <a:t>usermod</a:t>
+            </a:r>
+            <a:r>
+              <a:rPr lang="de-DE" sz="2400" dirty="0">
+                <a:latin typeface="Courier New" panose="02070309020205020404" pitchFamily="49" charset="0"/>
+                <a:cs typeface="Courier New" panose="02070309020205020404" pitchFamily="49" charset="0"/>
+              </a:rPr>
+              <a:t> -a -G microk8s $USER</a:t>
+            </a:r>
+          </a:p>
+          <a:p>
+            <a:pPr marL="0" indent="0">
+              <a:buNone/>
+            </a:pPr>
+            <a:r>
+              <a:rPr lang="de-DE" sz="2400" dirty="0">
+                <a:latin typeface="Courier New" panose="02070309020205020404" pitchFamily="49" charset="0"/>
+                <a:cs typeface="Courier New" panose="02070309020205020404" pitchFamily="49" charset="0"/>
+              </a:rPr>
+              <a:t>	</a:t>
+            </a:r>
+            <a:r>
+              <a:rPr lang="de-DE" sz="2400" dirty="0" err="1">
+                <a:latin typeface="Courier New" panose="02070309020205020404" pitchFamily="49" charset="0"/>
+                <a:cs typeface="Courier New" panose="02070309020205020404" pitchFamily="49" charset="0"/>
+              </a:rPr>
+              <a:t>sudo</a:t>
+            </a:r>
+            <a:r>
+              <a:rPr lang="de-DE" sz="2400" dirty="0">
+                <a:latin typeface="Courier New" panose="02070309020205020404" pitchFamily="49" charset="0"/>
+                <a:cs typeface="Courier New" panose="02070309020205020404" pitchFamily="49" charset="0"/>
+              </a:rPr>
+              <a:t> </a:t>
+            </a:r>
+            <a:r>
+              <a:rPr lang="de-DE" sz="2400" dirty="0" err="1">
+                <a:latin typeface="Courier New" panose="02070309020205020404" pitchFamily="49" charset="0"/>
+                <a:cs typeface="Courier New" panose="02070309020205020404" pitchFamily="49" charset="0"/>
+              </a:rPr>
+              <a:t>shutdown</a:t>
+            </a:r>
+            <a:r>
+              <a:rPr lang="de-DE" sz="2400" dirty="0">
+                <a:latin typeface="Courier New" panose="02070309020205020404" pitchFamily="49" charset="0"/>
+                <a:cs typeface="Courier New" panose="02070309020205020404" pitchFamily="49" charset="0"/>
+              </a:rPr>
+              <a:t> -</a:t>
+            </a:r>
+            <a:r>
+              <a:rPr lang="de-DE" sz="2400" dirty="0" err="1">
+                <a:latin typeface="Courier New" panose="02070309020205020404" pitchFamily="49" charset="0"/>
+                <a:cs typeface="Courier New" panose="02070309020205020404" pitchFamily="49" charset="0"/>
+              </a:rPr>
+              <a:t>r</a:t>
+            </a:r>
+            <a:r>
+              <a:rPr lang="de-DE" sz="2400" dirty="0">
+                <a:latin typeface="Courier New" panose="02070309020205020404" pitchFamily="49" charset="0"/>
+                <a:cs typeface="Courier New" panose="02070309020205020404" pitchFamily="49" charset="0"/>
+              </a:rPr>
+              <a:t> </a:t>
+            </a:r>
+            <a:r>
+              <a:rPr lang="de-DE" sz="2400" dirty="0" err="1">
+                <a:latin typeface="Courier New" panose="02070309020205020404" pitchFamily="49" charset="0"/>
+                <a:cs typeface="Courier New" panose="02070309020205020404" pitchFamily="49" charset="0"/>
+              </a:rPr>
+              <a:t>now</a:t>
             </a:r>
             <a:endParaRPr lang="de-DE" sz="2400" dirty="0">
               <a:latin typeface="Courier New" panose="02070309020205020404" pitchFamily="49" charset="0"/>
@@ -7219,129 +7891,12 @@
             </a:endParaRPr>
           </a:p>
           <a:p>
-            <a:pPr marL="0" indent="0">
-              <a:buNone/>
-            </a:pPr>
-            <a:r>
-              <a:rPr lang="de-DE" sz="2400" dirty="0">
-                <a:latin typeface="Courier New" panose="02070309020205020404" pitchFamily="49" charset="0"/>
-                <a:cs typeface="Courier New" panose="02070309020205020404" pitchFamily="49" charset="0"/>
-              </a:rPr>
-              <a:t>	microk8s </a:t>
-            </a:r>
-            <a:r>
-              <a:rPr lang="de-DE" sz="2400" dirty="0" err="1">
-                <a:latin typeface="Courier New" panose="02070309020205020404" pitchFamily="49" charset="0"/>
-                <a:cs typeface="Courier New" panose="02070309020205020404" pitchFamily="49" charset="0"/>
-              </a:rPr>
-              <a:t>enable</a:t>
-            </a:r>
-            <a:r>
-              <a:rPr lang="de-DE" sz="2400" dirty="0">
-                <a:latin typeface="Courier New" panose="02070309020205020404" pitchFamily="49" charset="0"/>
-                <a:cs typeface="Courier New" panose="02070309020205020404" pitchFamily="49" charset="0"/>
-              </a:rPr>
-              <a:t> </a:t>
-            </a:r>
-            <a:r>
-              <a:rPr lang="de-DE" sz="2400" dirty="0" err="1">
-                <a:latin typeface="Courier New" panose="02070309020205020404" pitchFamily="49" charset="0"/>
-                <a:cs typeface="Courier New" panose="02070309020205020404" pitchFamily="49" charset="0"/>
-              </a:rPr>
-              <a:t>dns</a:t>
-            </a:r>
-            <a:r>
-              <a:rPr lang="de-DE" sz="2400" dirty="0">
-                <a:latin typeface="Courier New" panose="02070309020205020404" pitchFamily="49" charset="0"/>
-                <a:cs typeface="Courier New" panose="02070309020205020404" pitchFamily="49" charset="0"/>
-              </a:rPr>
-              <a:t> </a:t>
-            </a:r>
-            <a:r>
-              <a:rPr lang="de-DE" sz="2400" dirty="0" err="1">
-                <a:latin typeface="Courier New" panose="02070309020205020404" pitchFamily="49" charset="0"/>
-                <a:cs typeface="Courier New" panose="02070309020205020404" pitchFamily="49" charset="0"/>
-              </a:rPr>
-              <a:t>dashboard</a:t>
-            </a:r>
-            <a:r>
-              <a:rPr lang="de-DE" sz="2400" dirty="0">
-                <a:latin typeface="Courier New" panose="02070309020205020404" pitchFamily="49" charset="0"/>
-                <a:cs typeface="Courier New" panose="02070309020205020404" pitchFamily="49" charset="0"/>
-              </a:rPr>
-              <a:t> </a:t>
-            </a:r>
-            <a:r>
-              <a:rPr lang="de-DE" sz="2400" dirty="0" err="1">
-                <a:latin typeface="Courier New" panose="02070309020205020404" pitchFamily="49" charset="0"/>
-                <a:cs typeface="Courier New" panose="02070309020205020404" pitchFamily="49" charset="0"/>
-              </a:rPr>
-              <a:t>storage</a:t>
-            </a:r>
-            <a:r>
-              <a:rPr lang="de-DE" sz="2400" dirty="0">
-                <a:latin typeface="Courier New" panose="02070309020205020404" pitchFamily="49" charset="0"/>
-                <a:cs typeface="Courier New" panose="02070309020205020404" pitchFamily="49" charset="0"/>
-              </a:rPr>
-              <a:t> </a:t>
-            </a:r>
-            <a:r>
-              <a:rPr lang="de-DE" sz="2400" dirty="0" err="1">
-                <a:latin typeface="Courier New" panose="02070309020205020404" pitchFamily="49" charset="0"/>
-                <a:cs typeface="Courier New" panose="02070309020205020404" pitchFamily="49" charset="0"/>
-              </a:rPr>
-              <a:t>ingress</a:t>
-            </a:r>
-            <a:endParaRPr lang="de-DE" sz="2400" dirty="0">
-              <a:latin typeface="Courier New" panose="02070309020205020404" pitchFamily="49" charset="0"/>
-              <a:cs typeface="Courier New" panose="02070309020205020404" pitchFamily="49" charset="0"/>
-            </a:endParaRPr>
-          </a:p>
-          <a:p>
-            <a:pPr marL="0" indent="0">
-              <a:buNone/>
-            </a:pPr>
-            <a:r>
-              <a:rPr lang="de-DE" sz="2400" dirty="0">
-                <a:latin typeface="Courier New" panose="02070309020205020404" pitchFamily="49" charset="0"/>
-                <a:cs typeface="Courier New" panose="02070309020205020404" pitchFamily="49" charset="0"/>
-              </a:rPr>
-              <a:t>	microk8s </a:t>
-            </a:r>
-            <a:r>
-              <a:rPr lang="de-DE" sz="2400" dirty="0" err="1">
-                <a:latin typeface="Courier New" panose="02070309020205020404" pitchFamily="49" charset="0"/>
-                <a:cs typeface="Courier New" panose="02070309020205020404" pitchFamily="49" charset="0"/>
-              </a:rPr>
-              <a:t>dashboard</a:t>
-            </a:r>
-            <a:r>
-              <a:rPr lang="de-DE" sz="2400" dirty="0">
-                <a:latin typeface="Courier New" panose="02070309020205020404" pitchFamily="49" charset="0"/>
-                <a:cs typeface="Courier New" panose="02070309020205020404" pitchFamily="49" charset="0"/>
-              </a:rPr>
-              <a:t>-proxy</a:t>
-            </a:r>
-          </a:p>
-          <a:p>
             <a:pPr lvl="1"/>
             <a:r>
               <a:rPr lang="de-DE" dirty="0">
                 <a:cs typeface="Courier New" panose="02070309020205020404" pitchFamily="49" charset="0"/>
               </a:rPr>
-              <a:t>Bitte warten, das kann ein paar Minuten dauern!</a:t>
-            </a:r>
-          </a:p>
-          <a:p>
-            <a:pPr marL="0" indent="0">
-              <a:buNone/>
-            </a:pPr>
-            <a:r>
-              <a:rPr lang="de-DE" dirty="0">
-                <a:latin typeface="Courier New" panose="02070309020205020404" pitchFamily="49" charset="0"/>
-                <a:cs typeface="Courier New" panose="02070309020205020404" pitchFamily="49" charset="0"/>
-              </a:rPr>
-              <a:t>	</a:t>
+              <a:t>Kurz warten: VM startet neu</a:t>
             </a:r>
           </a:p>
         </p:txBody>
@@ -7349,7 +7904,7 @@
     </p:spTree>
     <p:extLst>
       <p:ext uri="{BB962C8B-B14F-4D97-AF65-F5344CB8AC3E}">
-        <p14:creationId xmlns:p14="http://schemas.microsoft.com/office/powerpoint/2010/main" val="614538028"/>
+        <p14:creationId xmlns:p14="http://schemas.microsoft.com/office/powerpoint/2010/main" val="1270310899"/>
       </p:ext>
     </p:extLst>
   </p:cSld>

</xml_diff>